<commit_message>
BZD prak 3 done
</commit_message>
<xml_diff>
--- a/BZD/AXOB.pptx
+++ b/BZD/AXOB.pptx
@@ -15,6 +15,18 @@
     <p:sldId id="263" r:id="rId9"/>
     <p:sldId id="264" r:id="rId10"/>
     <p:sldId id="265" r:id="rId11"/>
+    <p:sldId id="266" r:id="rId12"/>
+    <p:sldId id="267" r:id="rId13"/>
+    <p:sldId id="268" r:id="rId14"/>
+    <p:sldId id="269" r:id="rId15"/>
+    <p:sldId id="270" r:id="rId16"/>
+    <p:sldId id="271" r:id="rId17"/>
+    <p:sldId id="272" r:id="rId18"/>
+    <p:sldId id="273" r:id="rId19"/>
+    <p:sldId id="274" r:id="rId20"/>
+    <p:sldId id="275" r:id="rId21"/>
+    <p:sldId id="276" r:id="rId22"/>
+    <p:sldId id="277" r:id="rId23"/>
   </p:sldIdLst>
   <p:sldSz cx="12192000" cy="6858000"/>
   <p:notesSz cx="6858000" cy="9144000"/>
@@ -113,7 +125,147 @@
       </a:defRPr>
     </a:lvl9pPr>
   </p:defaultTextStyle>
+  <p:extLst>
+    <p:ext uri="{EFAFB233-063F-42B5-8137-9DF3F51BA10A}">
+      <p15:sldGuideLst xmlns:p15="http://schemas.microsoft.com/office/powerpoint/2012/main"/>
+    </p:ext>
+  </p:extLst>
 </p:presentation>
+</file>
+
+<file path=ppt/ink/ink1.xml><?xml version="1.0" encoding="utf-8"?>
+<inkml:ink xmlns:inkml="http://www.w3.org/2003/InkML">
+  <inkml:definitions>
+    <inkml:context xml:id="ctx0">
+      <inkml:inkSource xml:id="inkSrc0">
+        <inkml:traceFormat>
+          <inkml:channel name="X" type="integer" min="-2.14748E9" max="2.14748E9" units="cm"/>
+          <inkml:channel name="Y" type="integer" min="-2.14748E9" max="2.14748E9" units="cm"/>
+        </inkml:traceFormat>
+        <inkml:channelProperties>
+          <inkml:channelProperty channel="X" name="resolution" value="1000" units="1/cm"/>
+          <inkml:channelProperty channel="Y" name="resolution" value="1000" units="1/cm"/>
+        </inkml:channelProperties>
+      </inkml:inkSource>
+      <inkml:timestamp xml:id="ts0" timeString="2024-11-15T09:48:52.279"/>
+    </inkml:context>
+    <inkml:brush xml:id="br0">
+      <inkml:brushProperty name="width" value="0.035" units="cm"/>
+      <inkml:brushProperty name="height" value="0.035" units="cm"/>
+      <inkml:brushProperty name="color" value="#FF33CC"/>
+      <inkml:brushProperty name="ignorePressure" value="1"/>
+    </inkml:brush>
+  </inkml:definitions>
+  <inkml:trace contextRef="#ctx0" brushRef="#br0">2 1,'4163'0,"-4147"0</inkml:trace>
+</inkml:ink>
+</file>
+
+<file path=ppt/ink/ink2.xml><?xml version="1.0" encoding="utf-8"?>
+<inkml:ink xmlns:inkml="http://www.w3.org/2003/InkML">
+  <inkml:definitions>
+    <inkml:context xml:id="ctx0">
+      <inkml:inkSource xml:id="inkSrc0">
+        <inkml:traceFormat>
+          <inkml:channel name="X" type="integer" min="-2.14748E9" max="2.14748E9" units="cm"/>
+          <inkml:channel name="Y" type="integer" min="-2.14748E9" max="2.14748E9" units="cm"/>
+        </inkml:traceFormat>
+        <inkml:channelProperties>
+          <inkml:channelProperty channel="X" name="resolution" value="1000" units="1/cm"/>
+          <inkml:channelProperty channel="Y" name="resolution" value="1000" units="1/cm"/>
+        </inkml:channelProperties>
+      </inkml:inkSource>
+      <inkml:timestamp xml:id="ts0" timeString="2024-11-15T09:49:08.461"/>
+    </inkml:context>
+    <inkml:brush xml:id="br0">
+      <inkml:brushProperty name="width" value="0.035" units="cm"/>
+      <inkml:brushProperty name="height" value="0.035" units="cm"/>
+      <inkml:brushProperty name="color" value="#E71224"/>
+      <inkml:brushProperty name="ignorePressure" value="1"/>
+    </inkml:brush>
+  </inkml:definitions>
+  <inkml:trace contextRef="#ctx0" brushRef="#br0">1 0,'4168'0,"-4156"0</inkml:trace>
+</inkml:ink>
+</file>
+
+<file path=ppt/ink/ink3.xml><?xml version="1.0" encoding="utf-8"?>
+<inkml:ink xmlns:inkml="http://www.w3.org/2003/InkML">
+  <inkml:definitions>
+    <inkml:context xml:id="ctx0">
+      <inkml:inkSource xml:id="inkSrc0">
+        <inkml:traceFormat>
+          <inkml:channel name="X" type="integer" min="-2.14748E9" max="2.14748E9" units="cm"/>
+          <inkml:channel name="Y" type="integer" min="-2.14748E9" max="2.14748E9" units="cm"/>
+        </inkml:traceFormat>
+        <inkml:channelProperties>
+          <inkml:channelProperty channel="X" name="resolution" value="1000" units="1/cm"/>
+          <inkml:channelProperty channel="Y" name="resolution" value="1000" units="1/cm"/>
+        </inkml:channelProperties>
+      </inkml:inkSource>
+      <inkml:timestamp xml:id="ts0" timeString="2024-11-15T09:49:51.133"/>
+    </inkml:context>
+    <inkml:brush xml:id="br0">
+      <inkml:brushProperty name="width" value="0.035" units="cm"/>
+      <inkml:brushProperty name="height" value="0.035" units="cm"/>
+      <inkml:brushProperty name="color" value="#E71224"/>
+      <inkml:brushProperty name="ignorePressure" value="1"/>
+    </inkml:brush>
+  </inkml:definitions>
+  <inkml:trace contextRef="#ctx0" brushRef="#br0">1 0,'4168'0,"-4156"0</inkml:trace>
+</inkml:ink>
+</file>
+
+<file path=ppt/ink/ink4.xml><?xml version="1.0" encoding="utf-8"?>
+<inkml:ink xmlns:inkml="http://www.w3.org/2003/InkML">
+  <inkml:definitions>
+    <inkml:context xml:id="ctx0">
+      <inkml:inkSource xml:id="inkSrc0">
+        <inkml:traceFormat>
+          <inkml:channel name="X" type="integer" min="-2.14748E9" max="2.14748E9" units="cm"/>
+          <inkml:channel name="Y" type="integer" min="-2.14748E9" max="2.14748E9" units="cm"/>
+        </inkml:traceFormat>
+        <inkml:channelProperties>
+          <inkml:channelProperty channel="X" name="resolution" value="1000" units="1/cm"/>
+          <inkml:channelProperty channel="Y" name="resolution" value="1000" units="1/cm"/>
+        </inkml:channelProperties>
+      </inkml:inkSource>
+      <inkml:timestamp xml:id="ts0" timeString="2024-11-15T09:50:01.878"/>
+    </inkml:context>
+    <inkml:brush xml:id="br0">
+      <inkml:brushProperty name="width" value="0.035" units="cm"/>
+      <inkml:brushProperty name="height" value="0.035" units="cm"/>
+      <inkml:brushProperty name="color" value="#FF33CC"/>
+      <inkml:brushProperty name="ignorePressure" value="1"/>
+    </inkml:brush>
+  </inkml:definitions>
+  <inkml:trace contextRef="#ctx0" brushRef="#br0">2 1,'4163'0,"-4147"0</inkml:trace>
+</inkml:ink>
+</file>
+
+<file path=ppt/ink/ink5.xml><?xml version="1.0" encoding="utf-8"?>
+<inkml:ink xmlns:inkml="http://www.w3.org/2003/InkML">
+  <inkml:definitions>
+    <inkml:context xml:id="ctx0">
+      <inkml:inkSource xml:id="inkSrc0">
+        <inkml:traceFormat>
+          <inkml:channel name="X" type="integer" min="-2.14748E9" max="2.14748E9" units="cm"/>
+          <inkml:channel name="Y" type="integer" min="-2.14748E9" max="2.14748E9" units="cm"/>
+        </inkml:traceFormat>
+        <inkml:channelProperties>
+          <inkml:channelProperty channel="X" name="resolution" value="1000" units="1/cm"/>
+          <inkml:channelProperty channel="Y" name="resolution" value="1000" units="1/cm"/>
+        </inkml:channelProperties>
+      </inkml:inkSource>
+      <inkml:timestamp xml:id="ts0" timeString="2024-11-15T09:50:20.740"/>
+    </inkml:context>
+    <inkml:brush xml:id="br0">
+      <inkml:brushProperty name="width" value="0.035" units="cm"/>
+      <inkml:brushProperty name="height" value="0.035" units="cm"/>
+      <inkml:brushProperty name="color" value="#33CCFF"/>
+      <inkml:brushProperty name="ignorePressure" value="1"/>
+    </inkml:brush>
+  </inkml:definitions>
+  <inkml:trace contextRef="#ctx0" brushRef="#br0">0 0,'4168'0,"-4156"0</inkml:trace>
+</inkml:ink>
 </file>
 
 <file path=ppt/slideLayouts/slideLayout1.xml><?xml version="1.0" encoding="utf-8"?>
@@ -301,7 +453,7 @@
           <a:p>
             <a:fld id="{AC99739C-7997-42FA-BC92-C798E3E5AD0D}" type="datetimeFigureOut">
               <a:rPr lang="ru-RU" smtClean="0"/>
-              <a:t>13.11.2024</a:t>
+              <a:t>15.11.2024</a:t>
             </a:fld>
             <a:endParaRPr lang="ru-RU"/>
           </a:p>
@@ -599,7 +751,7 @@
           <a:p>
             <a:fld id="{AC99739C-7997-42FA-BC92-C798E3E5AD0D}" type="datetimeFigureOut">
               <a:rPr lang="ru-RU" smtClean="0"/>
-              <a:t>13.11.2024</a:t>
+              <a:t>15.11.2024</a:t>
             </a:fld>
             <a:endParaRPr lang="ru-RU"/>
           </a:p>
@@ -791,7 +943,7 @@
           <a:p>
             <a:fld id="{AC99739C-7997-42FA-BC92-C798E3E5AD0D}" type="datetimeFigureOut">
               <a:rPr lang="ru-RU" smtClean="0"/>
-              <a:t>13.11.2024</a:t>
+              <a:t>15.11.2024</a:t>
             </a:fld>
             <a:endParaRPr lang="ru-RU"/>
           </a:p>
@@ -1052,7 +1204,7 @@
           <a:p>
             <a:fld id="{AC99739C-7997-42FA-BC92-C798E3E5AD0D}" type="datetimeFigureOut">
               <a:rPr lang="ru-RU" smtClean="0"/>
-              <a:t>13.11.2024</a:t>
+              <a:t>15.11.2024</a:t>
             </a:fld>
             <a:endParaRPr lang="ru-RU"/>
           </a:p>
@@ -1476,7 +1628,7 @@
           <a:p>
             <a:fld id="{AC99739C-7997-42FA-BC92-C798E3E5AD0D}" type="datetimeFigureOut">
               <a:rPr lang="ru-RU" smtClean="0"/>
-              <a:t>13.11.2024</a:t>
+              <a:t>15.11.2024</a:t>
             </a:fld>
             <a:endParaRPr lang="ru-RU"/>
           </a:p>
@@ -2013,7 +2165,7 @@
           <a:p>
             <a:fld id="{AC99739C-7997-42FA-BC92-C798E3E5AD0D}" type="datetimeFigureOut">
               <a:rPr lang="ru-RU" smtClean="0"/>
-              <a:t>13.11.2024</a:t>
+              <a:t>15.11.2024</a:t>
             </a:fld>
             <a:endParaRPr lang="ru-RU"/>
           </a:p>
@@ -2877,7 +3029,7 @@
           <a:p>
             <a:fld id="{AC99739C-7997-42FA-BC92-C798E3E5AD0D}" type="datetimeFigureOut">
               <a:rPr lang="ru-RU" smtClean="0"/>
-              <a:t>13.11.2024</a:t>
+              <a:t>15.11.2024</a:t>
             </a:fld>
             <a:endParaRPr lang="ru-RU"/>
           </a:p>
@@ -3047,7 +3199,7 @@
           <a:p>
             <a:fld id="{AC99739C-7997-42FA-BC92-C798E3E5AD0D}" type="datetimeFigureOut">
               <a:rPr lang="ru-RU" smtClean="0"/>
-              <a:t>13.11.2024</a:t>
+              <a:t>15.11.2024</a:t>
             </a:fld>
             <a:endParaRPr lang="ru-RU"/>
           </a:p>
@@ -3231,7 +3383,7 @@
           <a:p>
             <a:fld id="{AC99739C-7997-42FA-BC92-C798E3E5AD0D}" type="datetimeFigureOut">
               <a:rPr lang="ru-RU" smtClean="0"/>
-              <a:t>13.11.2024</a:t>
+              <a:t>15.11.2024</a:t>
             </a:fld>
             <a:endParaRPr lang="ru-RU"/>
           </a:p>
@@ -3401,7 +3553,7 @@
           <a:p>
             <a:fld id="{AC99739C-7997-42FA-BC92-C798E3E5AD0D}" type="datetimeFigureOut">
               <a:rPr lang="ru-RU" smtClean="0"/>
-              <a:t>13.11.2024</a:t>
+              <a:t>15.11.2024</a:t>
             </a:fld>
             <a:endParaRPr lang="ru-RU"/>
           </a:p>
@@ -3645,7 +3797,7 @@
           <a:p>
             <a:fld id="{AC99739C-7997-42FA-BC92-C798E3E5AD0D}" type="datetimeFigureOut">
               <a:rPr lang="ru-RU" smtClean="0"/>
-              <a:t>13.11.2024</a:t>
+              <a:t>15.11.2024</a:t>
             </a:fld>
             <a:endParaRPr lang="ru-RU"/>
           </a:p>
@@ -3881,7 +4033,7 @@
           <a:p>
             <a:fld id="{AC99739C-7997-42FA-BC92-C798E3E5AD0D}" type="datetimeFigureOut">
               <a:rPr lang="ru-RU" smtClean="0"/>
-              <a:t>13.11.2024</a:t>
+              <a:t>15.11.2024</a:t>
             </a:fld>
             <a:endParaRPr lang="ru-RU"/>
           </a:p>
@@ -4347,7 +4499,7 @@
           <a:p>
             <a:fld id="{AC99739C-7997-42FA-BC92-C798E3E5AD0D}" type="datetimeFigureOut">
               <a:rPr lang="ru-RU" smtClean="0"/>
-              <a:t>13.11.2024</a:t>
+              <a:t>15.11.2024</a:t>
             </a:fld>
             <a:endParaRPr lang="ru-RU"/>
           </a:p>
@@ -4465,7 +4617,7 @@
           <a:p>
             <a:fld id="{AC99739C-7997-42FA-BC92-C798E3E5AD0D}" type="datetimeFigureOut">
               <a:rPr lang="ru-RU" smtClean="0"/>
-              <a:t>13.11.2024</a:t>
+              <a:t>15.11.2024</a:t>
             </a:fld>
             <a:endParaRPr lang="ru-RU"/>
           </a:p>
@@ -4560,7 +4712,7 @@
           <a:p>
             <a:fld id="{AC99739C-7997-42FA-BC92-C798E3E5AD0D}" type="datetimeFigureOut">
               <a:rPr lang="ru-RU" smtClean="0"/>
-              <a:t>13.11.2024</a:t>
+              <a:t>15.11.2024</a:t>
             </a:fld>
             <a:endParaRPr lang="ru-RU"/>
           </a:p>
@@ -4815,7 +4967,7 @@
           <a:p>
             <a:fld id="{AC99739C-7997-42FA-BC92-C798E3E5AD0D}" type="datetimeFigureOut">
               <a:rPr lang="ru-RU" smtClean="0"/>
-              <a:t>13.11.2024</a:t>
+              <a:t>15.11.2024</a:t>
             </a:fld>
             <a:endParaRPr lang="ru-RU"/>
           </a:p>
@@ -5115,7 +5267,7 @@
           <a:p>
             <a:fld id="{AC99739C-7997-42FA-BC92-C798E3E5AD0D}" type="datetimeFigureOut">
               <a:rPr lang="ru-RU" smtClean="0"/>
-              <a:t>13.11.2024</a:t>
+              <a:t>15.11.2024</a:t>
             </a:fld>
             <a:endParaRPr lang="ru-RU"/>
           </a:p>
@@ -5349,7 +5501,7 @@
           <a:p>
             <a:fld id="{AC99739C-7997-42FA-BC92-C798E3E5AD0D}" type="datetimeFigureOut">
               <a:rPr lang="ru-RU" smtClean="0"/>
-              <a:t>13.11.2024</a:t>
+              <a:t>15.11.2024</a:t>
             </a:fld>
             <a:endParaRPr lang="ru-RU"/>
           </a:p>
@@ -6149,7 +6301,19 @@
             </a:pPr>
             <a:r>
               <a:rPr lang="ru-RU" dirty="0"/>
-              <a:t>Из рассмотрения зон химического загрязнения для различных случаев вертикальной устойчивости воздуха видим, что наиболее опасным является случай – инверсия. Ширина зоны химического загрязнения при инверсии составит примерно 0,5 км, что при благоприятных условиях (достаточного времени до подхода облака с АХОВ к предприятию) возможно эвакуация (выведение) людей за пределы зоны химического загрязнения на расстояние половины ширины т.е. на 100-150м. </a:t>
+              <a:t>Из рассмотрения зон химического загрязнения для различных случаев вертикальной устойчивости воздуха видим, что наиболее опасным является случай – инверсия. Ширина зоны химического загрязнения при инверсии составит примерно 0,5 км, что</a:t>
+            </a:r>
+            <a:r>
+              <a:rPr lang="en-US" dirty="0"/>
+              <a:t> </a:t>
+            </a:r>
+            <a:r>
+              <a:rPr lang="ru-RU" dirty="0">
+                <a:solidFill>
+                  <a:srgbClr val="FF0000"/>
+                </a:solidFill>
+              </a:rPr>
+              <a:t>вопрос эвакуации????</a:t>
             </a:r>
           </a:p>
         </p:txBody>
@@ -6158,6 +6322,2241 @@
     <p:extLst>
       <p:ext uri="{BB962C8B-B14F-4D97-AF65-F5344CB8AC3E}">
         <p14:creationId xmlns:p14="http://schemas.microsoft.com/office/powerpoint/2010/main" val="2485635067"/>
+      </p:ext>
+    </p:extLst>
+  </p:cSld>
+  <p:clrMapOvr>
+    <a:masterClrMapping/>
+  </p:clrMapOvr>
+</p:sld>
+</file>
+
+<file path=ppt/slides/slide11.xml><?xml version="1.0" encoding="utf-8"?>
+<p:sld xmlns:a="http://schemas.openxmlformats.org/drawingml/2006/main" xmlns:r="http://schemas.openxmlformats.org/officeDocument/2006/relationships" xmlns:p="http://schemas.openxmlformats.org/presentationml/2006/main">
+  <p:cSld>
+    <p:bg>
+      <p:bgPr>
+        <a:blipFill rotWithShape="1">
+          <a:blip r:embed="rId2">
+            <a:duotone>
+              <a:schemeClr val="bg2">
+                <a:shade val="80000"/>
+                <a:lumMod val="80000"/>
+              </a:schemeClr>
+              <a:schemeClr val="bg2">
+                <a:tint val="98000"/>
+              </a:schemeClr>
+            </a:duotone>
+          </a:blip>
+          <a:stretch/>
+        </a:blipFill>
+        <a:effectLst/>
+      </p:bgPr>
+    </p:bg>
+    <p:spTree>
+      <p:nvGrpSpPr>
+        <p:cNvPr id="1" name=""/>
+        <p:cNvGrpSpPr/>
+        <p:nvPr/>
+      </p:nvGrpSpPr>
+      <p:grpSpPr>
+        <a:xfrm>
+          <a:off x="0" y="0"/>
+          <a:ext cx="0" cy="0"/>
+          <a:chOff x="0" y="0"/>
+          <a:chExt cx="0" cy="0"/>
+        </a:xfrm>
+      </p:grpSpPr>
+      <p:sp>
+        <p:nvSpPr>
+          <p:cNvPr id="2" name="Заголовок 1">
+            <a:extLst>
+              <a:ext uri="{FF2B5EF4-FFF2-40B4-BE49-F238E27FC236}">
+                <a16:creationId xmlns:a16="http://schemas.microsoft.com/office/drawing/2014/main" id="{9249C39E-9550-D00C-EB79-AE5260CB00E9}"/>
+              </a:ext>
+            </a:extLst>
+          </p:cNvPr>
+          <p:cNvSpPr>
+            <a:spLocks noGrp="1"/>
+          </p:cNvSpPr>
+          <p:nvPr>
+            <p:ph type="title"/>
+          </p:nvPr>
+        </p:nvSpPr>
+        <p:spPr>
+          <a:xfrm>
+            <a:off x="913795" y="609600"/>
+            <a:ext cx="3078749" cy="970450"/>
+          </a:xfrm>
+        </p:spPr>
+        <p:txBody>
+          <a:bodyPr anchor="b">
+            <a:normAutofit/>
+          </a:bodyPr>
+          <a:lstStyle/>
+          <a:p>
+            <a:pPr algn="l"/>
+            <a:r>
+              <a:rPr lang="ru-RU" sz="2800" dirty="0"/>
+              <a:t>Зоны поражения на карте</a:t>
+            </a:r>
+          </a:p>
+        </p:txBody>
+      </p:sp>
+      <p:sp>
+        <p:nvSpPr>
+          <p:cNvPr id="10" name="Content Placeholder 9">
+            <a:extLst>
+              <a:ext uri="{FF2B5EF4-FFF2-40B4-BE49-F238E27FC236}">
+                <a16:creationId xmlns:a16="http://schemas.microsoft.com/office/drawing/2014/main" id="{992F738D-56CB-97C1-6E39-C86549306423}"/>
+              </a:ext>
+            </a:extLst>
+          </p:cNvPr>
+          <p:cNvSpPr>
+            <a:spLocks noGrp="1"/>
+          </p:cNvSpPr>
+          <p:nvPr>
+            <p:ph idx="1"/>
+          </p:nvPr>
+        </p:nvSpPr>
+        <p:spPr>
+          <a:xfrm>
+            <a:off x="913795" y="1732449"/>
+            <a:ext cx="3330401" cy="4058751"/>
+          </a:xfrm>
+        </p:spPr>
+        <p:txBody>
+          <a:bodyPr anchor="t">
+            <a:normAutofit/>
+          </a:bodyPr>
+          <a:lstStyle/>
+          <a:p>
+            <a:pPr marL="36900" indent="0">
+              <a:buNone/>
+            </a:pPr>
+            <a:r>
+              <a:rPr lang="ru-RU" sz="1600" dirty="0" err="1"/>
+              <a:t>Г</a:t>
+            </a:r>
+            <a:r>
+              <a:rPr lang="ru-RU" sz="1600" baseline="-25000" dirty="0" err="1"/>
+              <a:t>изот</a:t>
+            </a:r>
+            <a:r>
+              <a:rPr lang="ru-RU" sz="1600" dirty="0"/>
+              <a:t> = 4,4 км </a:t>
+            </a:r>
+          </a:p>
+          <a:p>
+            <a:pPr marL="36900" indent="0">
+              <a:buNone/>
+            </a:pPr>
+            <a:r>
+              <a:rPr lang="ru-RU" sz="1600" dirty="0" err="1"/>
+              <a:t>Ш</a:t>
+            </a:r>
+            <a:r>
+              <a:rPr lang="ru-RU" sz="1600" baseline="-25000" dirty="0" err="1"/>
+              <a:t>изот</a:t>
+            </a:r>
+            <a:r>
+              <a:rPr lang="ru-RU" sz="1600" dirty="0"/>
+              <a:t> = 0,66 км</a:t>
+            </a:r>
+          </a:p>
+          <a:p>
+            <a:pPr marL="36900" indent="0">
+              <a:buNone/>
+            </a:pPr>
+            <a:r>
+              <a:rPr lang="ru-RU" sz="1600" dirty="0" err="1"/>
+              <a:t>Г</a:t>
+            </a:r>
+            <a:r>
+              <a:rPr lang="ru-RU" sz="1600" baseline="-25000" dirty="0" err="1"/>
+              <a:t>инв</a:t>
+            </a:r>
+            <a:r>
+              <a:rPr lang="ru-RU" sz="1600" dirty="0"/>
+              <a:t> = 16,72 км </a:t>
+            </a:r>
+          </a:p>
+          <a:p>
+            <a:pPr marL="36900" indent="0">
+              <a:buNone/>
+            </a:pPr>
+            <a:r>
+              <a:rPr lang="ru-RU" sz="1600" dirty="0" err="1"/>
+              <a:t>Ш</a:t>
+            </a:r>
+            <a:r>
+              <a:rPr lang="ru-RU" sz="1600" baseline="-25000" dirty="0" err="1"/>
+              <a:t>инв</a:t>
+            </a:r>
+            <a:r>
+              <a:rPr lang="ru-RU" sz="1600" baseline="-25000" dirty="0"/>
+              <a:t> </a:t>
+            </a:r>
+            <a:r>
+              <a:rPr lang="ru-RU" sz="1600" dirty="0"/>
+              <a:t>= 0,5016 км</a:t>
+            </a:r>
+          </a:p>
+          <a:p>
+            <a:pPr marL="36900" indent="0">
+              <a:buNone/>
+            </a:pPr>
+            <a:r>
+              <a:rPr lang="ru-RU" sz="1600" dirty="0" err="1"/>
+              <a:t>Г</a:t>
+            </a:r>
+            <a:r>
+              <a:rPr lang="ru-RU" sz="1600" baseline="-25000" dirty="0" err="1"/>
+              <a:t>конв</a:t>
+            </a:r>
+            <a:r>
+              <a:rPr lang="ru-RU" sz="1600" dirty="0"/>
+              <a:t> = 0,968 км</a:t>
+            </a:r>
+          </a:p>
+          <a:p>
+            <a:pPr marL="36900" indent="0">
+              <a:buNone/>
+            </a:pPr>
+            <a:r>
+              <a:rPr lang="ru-RU" sz="1600" dirty="0" err="1"/>
+              <a:t>Ш</a:t>
+            </a:r>
+            <a:r>
+              <a:rPr lang="ru-RU" sz="1600" baseline="-25000" dirty="0" err="1"/>
+              <a:t>конв</a:t>
+            </a:r>
+            <a:r>
+              <a:rPr lang="ru-RU" sz="1600" dirty="0"/>
+              <a:t> = 0,7744 км</a:t>
+            </a:r>
+          </a:p>
+          <a:p>
+            <a:pPr marL="36900" indent="0">
+              <a:buNone/>
+            </a:pPr>
+            <a:endParaRPr lang="ru-RU" sz="1600" dirty="0"/>
+          </a:p>
+          <a:p>
+            <a:endParaRPr lang="en-US" sz="1600" dirty="0"/>
+          </a:p>
+        </p:txBody>
+      </p:sp>
+      <p:pic>
+        <p:nvPicPr>
+          <p:cNvPr id="13" name="Picture 12">
+            <a:extLst>
+              <a:ext uri="{FF2B5EF4-FFF2-40B4-BE49-F238E27FC236}">
+                <a16:creationId xmlns:a16="http://schemas.microsoft.com/office/drawing/2014/main" id="{B536FA4E-0152-4E27-91DA-0FC22D1846BB}"/>
+              </a:ext>
+              <a:ext uri="{C183D7F6-B498-43B3-948B-1728B52AA6E4}">
+                <adec:decorative xmlns:adec="http://schemas.microsoft.com/office/drawing/2017/decorative" val="1"/>
+              </a:ext>
+            </a:extLst>
+          </p:cNvPr>
+          <p:cNvPicPr>
+            <a:picLocks noGrp="1" noRot="1" noChangeAspect="1" noMove="1" noResize="1" noEditPoints="1" noAdjustHandles="1" noChangeArrowheads="1" noChangeShapeType="1" noCrop="1"/>
+          </p:cNvPicPr>
+          <p:nvPr>
+            <p:extLst>
+              <p:ext uri="{386F3935-93C4-4BCD-93E2-E3B085C9AB24}">
+                <p16:designElem xmlns:p16="http://schemas.microsoft.com/office/powerpoint/2015/main" val="1"/>
+              </p:ext>
+            </p:extLst>
+          </p:nvPr>
+        </p:nvPicPr>
+        <p:blipFill rotWithShape="1">
+          <a:blip r:embed="rId3">
+            <a:extLst>
+              <a:ext uri="{28A0092B-C50C-407E-A947-70E740481C1C}">
+                <a14:useLocalDpi xmlns:a14="http://schemas.microsoft.com/office/drawing/2010/main" val="0"/>
+              </a:ext>
+            </a:extLst>
+          </a:blip>
+          <a:srcRect t="964" r="2807" b="1446"/>
+          <a:stretch/>
+        </p:blipFill>
+        <p:spPr>
+          <a:xfrm>
+            <a:off x="4552950" y="1"/>
+            <a:ext cx="7639050" cy="6858000"/>
+          </a:xfrm>
+          <a:prstGeom prst="rect">
+            <a:avLst/>
+          </a:prstGeom>
+        </p:spPr>
+      </p:pic>
+      <p:pic>
+        <p:nvPicPr>
+          <p:cNvPr id="6" name="Объект 5" descr="Изображение выглядит как карта, текст, атлас, диаграмма&#10;&#10;Автоматически созданное описание">
+            <a:extLst>
+              <a:ext uri="{FF2B5EF4-FFF2-40B4-BE49-F238E27FC236}">
+                <a16:creationId xmlns:a16="http://schemas.microsoft.com/office/drawing/2014/main" id="{6AE4D70C-FB6B-4A50-788F-FB7ABF91F75D}"/>
+              </a:ext>
+            </a:extLst>
+          </p:cNvPr>
+          <p:cNvPicPr>
+            <a:picLocks noChangeAspect="1"/>
+          </p:cNvPicPr>
+          <p:nvPr/>
+        </p:nvPicPr>
+        <p:blipFill>
+          <a:blip r:embed="rId4">
+            <a:extLst>
+              <a:ext uri="{28A0092B-C50C-407E-A947-70E740481C1C}">
+                <a14:useLocalDpi xmlns:a14="http://schemas.microsoft.com/office/drawing/2010/main" val="0"/>
+              </a:ext>
+            </a:extLst>
+          </a:blip>
+          <a:srcRect t="11919" r="1" b="22802"/>
+          <a:stretch/>
+        </p:blipFill>
+        <p:spPr>
+          <a:xfrm>
+            <a:off x="4654295" y="10"/>
+            <a:ext cx="7537705" cy="6857990"/>
+          </a:xfrm>
+          <a:prstGeom prst="rect">
+            <a:avLst/>
+          </a:prstGeom>
+        </p:spPr>
+      </p:pic>
+      <mc:AlternateContent xmlns:mc="http://schemas.openxmlformats.org/markup-compatibility/2006">
+        <mc:Choice xmlns:p14="http://schemas.microsoft.com/office/powerpoint/2010/main" Requires="p14">
+          <p:contentPart p14:bwMode="auto" r:id="rId5">
+            <p14:nvContentPartPr>
+              <p14:cNvPr id="20" name="Рукописный ввод 19">
+                <a:extLst>
+                  <a:ext uri="{FF2B5EF4-FFF2-40B4-BE49-F238E27FC236}">
+                    <a16:creationId xmlns:a16="http://schemas.microsoft.com/office/drawing/2014/main" id="{C172B058-F4A1-FE6F-6294-FC7913CE39A5}"/>
+                  </a:ext>
+                </a:extLst>
+              </p14:cNvPr>
+              <p14:cNvContentPartPr/>
+              <p14:nvPr/>
+            </p14:nvContentPartPr>
+            <p14:xfrm>
+              <a:off x="1047750" y="2503001"/>
+              <a:ext cx="1504950" cy="360"/>
+            </p14:xfrm>
+          </p:contentPart>
+        </mc:Choice>
+        <mc:Fallback>
+          <p:pic>
+            <p:nvPicPr>
+              <p:cNvPr id="20" name="Рукописный ввод 19">
+                <a:extLst>
+                  <a:ext uri="{FF2B5EF4-FFF2-40B4-BE49-F238E27FC236}">
+                    <a16:creationId xmlns:a16="http://schemas.microsoft.com/office/drawing/2014/main" id="{C172B058-F4A1-FE6F-6294-FC7913CE39A5}"/>
+                  </a:ext>
+                </a:extLst>
+              </p:cNvPr>
+              <p:cNvPicPr/>
+              <p:nvPr/>
+            </p:nvPicPr>
+            <p:blipFill>
+              <a:blip r:embed="rId6"/>
+              <a:stretch>
+                <a:fillRect/>
+              </a:stretch>
+            </p:blipFill>
+            <p:spPr>
+              <a:xfrm>
+                <a:off x="1041629" y="2496881"/>
+                <a:ext cx="1517191" cy="12600"/>
+              </a:xfrm>
+              <a:prstGeom prst="rect">
+                <a:avLst/>
+              </a:prstGeom>
+            </p:spPr>
+          </p:pic>
+        </mc:Fallback>
+      </mc:AlternateContent>
+      <mc:AlternateContent xmlns:mc="http://schemas.openxmlformats.org/markup-compatibility/2006">
+        <mc:Choice xmlns:p14="http://schemas.microsoft.com/office/powerpoint/2010/main" Requires="p14">
+          <p:contentPart p14:bwMode="auto" r:id="rId7">
+            <p14:nvContentPartPr>
+              <p14:cNvPr id="21" name="Рукописный ввод 20">
+                <a:extLst>
+                  <a:ext uri="{FF2B5EF4-FFF2-40B4-BE49-F238E27FC236}">
+                    <a16:creationId xmlns:a16="http://schemas.microsoft.com/office/drawing/2014/main" id="{E98ED9EC-AD4F-3B73-1289-139F9D3C6C63}"/>
+                  </a:ext>
+                </a:extLst>
+              </p14:cNvPr>
+              <p14:cNvContentPartPr/>
+              <p14:nvPr/>
+            </p14:nvContentPartPr>
+            <p14:xfrm>
+              <a:off x="1047750" y="1785176"/>
+              <a:ext cx="1504950" cy="360"/>
+            </p14:xfrm>
+          </p:contentPart>
+        </mc:Choice>
+        <mc:Fallback>
+          <p:pic>
+            <p:nvPicPr>
+              <p:cNvPr id="21" name="Рукописный ввод 20">
+                <a:extLst>
+                  <a:ext uri="{FF2B5EF4-FFF2-40B4-BE49-F238E27FC236}">
+                    <a16:creationId xmlns:a16="http://schemas.microsoft.com/office/drawing/2014/main" id="{E98ED9EC-AD4F-3B73-1289-139F9D3C6C63}"/>
+                  </a:ext>
+                </a:extLst>
+              </p:cNvPr>
+              <p:cNvPicPr/>
+              <p:nvPr/>
+            </p:nvPicPr>
+            <p:blipFill>
+              <a:blip r:embed="rId8"/>
+              <a:stretch>
+                <a:fillRect/>
+              </a:stretch>
+            </p:blipFill>
+            <p:spPr>
+              <a:xfrm>
+                <a:off x="1041631" y="1779056"/>
+                <a:ext cx="1517188" cy="12600"/>
+              </a:xfrm>
+              <a:prstGeom prst="rect">
+                <a:avLst/>
+              </a:prstGeom>
+            </p:spPr>
+          </p:pic>
+        </mc:Fallback>
+      </mc:AlternateContent>
+      <mc:AlternateContent xmlns:mc="http://schemas.openxmlformats.org/markup-compatibility/2006">
+        <mc:Choice xmlns:p14="http://schemas.microsoft.com/office/powerpoint/2010/main" Requires="p14">
+          <p:contentPart p14:bwMode="auto" r:id="rId9">
+            <p14:nvContentPartPr>
+              <p14:cNvPr id="22" name="Рукописный ввод 21">
+                <a:extLst>
+                  <a:ext uri="{FF2B5EF4-FFF2-40B4-BE49-F238E27FC236}">
+                    <a16:creationId xmlns:a16="http://schemas.microsoft.com/office/drawing/2014/main" id="{6A8A1124-05EF-01B4-6A89-A366C2919A16}"/>
+                  </a:ext>
+                </a:extLst>
+              </p14:cNvPr>
+              <p14:cNvContentPartPr/>
+              <p14:nvPr/>
+            </p14:nvContentPartPr>
+            <p14:xfrm>
+              <a:off x="1047750" y="2445576"/>
+              <a:ext cx="1504950" cy="360"/>
+            </p14:xfrm>
+          </p:contentPart>
+        </mc:Choice>
+        <mc:Fallback>
+          <p:pic>
+            <p:nvPicPr>
+              <p:cNvPr id="22" name="Рукописный ввод 21">
+                <a:extLst>
+                  <a:ext uri="{FF2B5EF4-FFF2-40B4-BE49-F238E27FC236}">
+                    <a16:creationId xmlns:a16="http://schemas.microsoft.com/office/drawing/2014/main" id="{6A8A1124-05EF-01B4-6A89-A366C2919A16}"/>
+                  </a:ext>
+                </a:extLst>
+              </p:cNvPr>
+              <p:cNvPicPr/>
+              <p:nvPr/>
+            </p:nvPicPr>
+            <p:blipFill>
+              <a:blip r:embed="rId8"/>
+              <a:stretch>
+                <a:fillRect/>
+              </a:stretch>
+            </p:blipFill>
+            <p:spPr>
+              <a:xfrm>
+                <a:off x="1041631" y="2439456"/>
+                <a:ext cx="1517188" cy="12600"/>
+              </a:xfrm>
+              <a:prstGeom prst="rect">
+                <a:avLst/>
+              </a:prstGeom>
+            </p:spPr>
+          </p:pic>
+        </mc:Fallback>
+      </mc:AlternateContent>
+      <mc:AlternateContent xmlns:mc="http://schemas.openxmlformats.org/markup-compatibility/2006">
+        <mc:Choice xmlns:p14="http://schemas.microsoft.com/office/powerpoint/2010/main" Requires="p14">
+          <p:contentPart p14:bwMode="auto" r:id="rId10">
+            <p14:nvContentPartPr>
+              <p14:cNvPr id="23" name="Рукописный ввод 22">
+                <a:extLst>
+                  <a:ext uri="{FF2B5EF4-FFF2-40B4-BE49-F238E27FC236}">
+                    <a16:creationId xmlns:a16="http://schemas.microsoft.com/office/drawing/2014/main" id="{185D0EFC-1E76-3F13-7B9E-9C69BC14C98D}"/>
+                  </a:ext>
+                </a:extLst>
+              </p14:cNvPr>
+              <p14:cNvContentPartPr/>
+              <p14:nvPr/>
+            </p14:nvContentPartPr>
+            <p14:xfrm>
+              <a:off x="1047750" y="3163496"/>
+              <a:ext cx="1504950" cy="360"/>
+            </p14:xfrm>
+          </p:contentPart>
+        </mc:Choice>
+        <mc:Fallback>
+          <p:pic>
+            <p:nvPicPr>
+              <p:cNvPr id="23" name="Рукописный ввод 22">
+                <a:extLst>
+                  <a:ext uri="{FF2B5EF4-FFF2-40B4-BE49-F238E27FC236}">
+                    <a16:creationId xmlns:a16="http://schemas.microsoft.com/office/drawing/2014/main" id="{185D0EFC-1E76-3F13-7B9E-9C69BC14C98D}"/>
+                  </a:ext>
+                </a:extLst>
+              </p:cNvPr>
+              <p:cNvPicPr/>
+              <p:nvPr/>
+            </p:nvPicPr>
+            <p:blipFill>
+              <a:blip r:embed="rId6"/>
+              <a:stretch>
+                <a:fillRect/>
+              </a:stretch>
+            </p:blipFill>
+            <p:spPr>
+              <a:xfrm>
+                <a:off x="1041629" y="3157376"/>
+                <a:ext cx="1517191" cy="12600"/>
+              </a:xfrm>
+              <a:prstGeom prst="rect">
+                <a:avLst/>
+              </a:prstGeom>
+            </p:spPr>
+          </p:pic>
+        </mc:Fallback>
+      </mc:AlternateContent>
+      <p:sp>
+        <p:nvSpPr>
+          <p:cNvPr id="8" name="Прямая соединительная линия 7">
+            <a:extLst>
+              <a:ext uri="{FF2B5EF4-FFF2-40B4-BE49-F238E27FC236}">
+                <a16:creationId xmlns:a16="http://schemas.microsoft.com/office/drawing/2014/main" id="{576A4975-9F50-436C-B3EF-ACFECED90895}"/>
+              </a:ext>
+            </a:extLst>
+          </p:cNvPr>
+          <p:cNvSpPr/>
+          <p:nvPr/>
+        </p:nvSpPr>
+        <p:spPr>
+          <a:xfrm>
+            <a:off x="1047750" y="3224260"/>
+            <a:ext cx="1504950" cy="7170"/>
+          </a:xfrm>
+          <a:prstGeom prst="line">
+            <a:avLst/>
+          </a:prstGeom>
+          <a:solidFill>
+            <a:srgbClr val="33CCFF">
+              <a:alpha val="5000"/>
+            </a:srgbClr>
+          </a:solidFill>
+          <a:ln w="12600">
+            <a:solidFill>
+              <a:srgbClr val="33CCFF"/>
+            </a:solidFill>
+          </a:ln>
+        </p:spPr>
+        <p:style>
+          <a:lnRef idx="1">
+            <a:schemeClr val="accent1"/>
+          </a:lnRef>
+          <a:fillRef idx="0">
+            <a:schemeClr val="accent1"/>
+          </a:fillRef>
+          <a:effectRef idx="0">
+            <a:schemeClr val="accent1"/>
+          </a:effectRef>
+          <a:fontRef idx="minor">
+            <a:schemeClr val="tx1"/>
+          </a:fontRef>
+        </p:style>
+        <p:txBody>
+          <a:bodyPr wrap="none" rtlCol="0" anchor="ctr" anchorCtr="1"/>
+          <a:lstStyle/>
+          <a:p>
+            <a:endParaRPr lang="en-US">
+              <a:solidFill>
+                <a:srgbClr val="33CCFF"/>
+              </a:solidFill>
+            </a:endParaRPr>
+          </a:p>
+        </p:txBody>
+      </p:sp>
+      <mc:AlternateContent xmlns:mc="http://schemas.openxmlformats.org/markup-compatibility/2006">
+        <mc:Choice xmlns:p14="http://schemas.microsoft.com/office/powerpoint/2010/main" Requires="p14">
+          <p:contentPart p14:bwMode="auto" r:id="rId11">
+            <p14:nvContentPartPr>
+              <p14:cNvPr id="24" name="Рукописный ввод 23">
+                <a:extLst>
+                  <a:ext uri="{FF2B5EF4-FFF2-40B4-BE49-F238E27FC236}">
+                    <a16:creationId xmlns:a16="http://schemas.microsoft.com/office/drawing/2014/main" id="{4FF65E5A-32E5-80AD-83C6-CC2B22025A58}"/>
+                  </a:ext>
+                </a:extLst>
+              </p14:cNvPr>
+              <p14:cNvContentPartPr/>
+              <p14:nvPr/>
+            </p14:nvContentPartPr>
+            <p14:xfrm>
+              <a:off x="1047750" y="3891089"/>
+              <a:ext cx="1504950" cy="360"/>
+            </p14:xfrm>
+          </p:contentPart>
+        </mc:Choice>
+        <mc:Fallback>
+          <p:pic>
+            <p:nvPicPr>
+              <p:cNvPr id="24" name="Рукописный ввод 23">
+                <a:extLst>
+                  <a:ext uri="{FF2B5EF4-FFF2-40B4-BE49-F238E27FC236}">
+                    <a16:creationId xmlns:a16="http://schemas.microsoft.com/office/drawing/2014/main" id="{4FF65E5A-32E5-80AD-83C6-CC2B22025A58}"/>
+                  </a:ext>
+                </a:extLst>
+              </p:cNvPr>
+              <p:cNvPicPr/>
+              <p:nvPr/>
+            </p:nvPicPr>
+            <p:blipFill>
+              <a:blip r:embed="rId12"/>
+              <a:stretch>
+                <a:fillRect/>
+              </a:stretch>
+            </p:blipFill>
+            <p:spPr>
+              <a:xfrm>
+                <a:off x="1041631" y="3884969"/>
+                <a:ext cx="1517188" cy="12600"/>
+              </a:xfrm>
+              <a:prstGeom prst="rect">
+                <a:avLst/>
+              </a:prstGeom>
+            </p:spPr>
+          </p:pic>
+        </mc:Fallback>
+      </mc:AlternateContent>
+    </p:spTree>
+    <p:extLst>
+      <p:ext uri="{BB962C8B-B14F-4D97-AF65-F5344CB8AC3E}">
+        <p14:creationId xmlns:p14="http://schemas.microsoft.com/office/powerpoint/2010/main" val="1208979605"/>
+      </p:ext>
+    </p:extLst>
+  </p:cSld>
+  <p:clrMapOvr>
+    <a:masterClrMapping/>
+  </p:clrMapOvr>
+</p:sld>
+</file>
+
+<file path=ppt/slides/slide12.xml><?xml version="1.0" encoding="utf-8"?>
+<p:sld xmlns:a="http://schemas.openxmlformats.org/drawingml/2006/main" xmlns:r="http://schemas.openxmlformats.org/officeDocument/2006/relationships" xmlns:p="http://schemas.openxmlformats.org/presentationml/2006/main">
+  <p:cSld>
+    <p:spTree>
+      <p:nvGrpSpPr>
+        <p:cNvPr id="1" name=""/>
+        <p:cNvGrpSpPr/>
+        <p:nvPr/>
+      </p:nvGrpSpPr>
+      <p:grpSpPr>
+        <a:xfrm>
+          <a:off x="0" y="0"/>
+          <a:ext cx="0" cy="0"/>
+          <a:chOff x="0" y="0"/>
+          <a:chExt cx="0" cy="0"/>
+        </a:xfrm>
+      </p:grpSpPr>
+      <p:sp>
+        <p:nvSpPr>
+          <p:cNvPr id="2" name="Заголовок 1">
+            <a:extLst>
+              <a:ext uri="{FF2B5EF4-FFF2-40B4-BE49-F238E27FC236}">
+                <a16:creationId xmlns:a16="http://schemas.microsoft.com/office/drawing/2014/main" id="{912C5F0E-BFAC-FAEE-5FCF-25CB9648953B}"/>
+              </a:ext>
+            </a:extLst>
+          </p:cNvPr>
+          <p:cNvSpPr>
+            <a:spLocks noGrp="1"/>
+          </p:cNvSpPr>
+          <p:nvPr>
+            <p:ph type="title"/>
+          </p:nvPr>
+        </p:nvSpPr>
+        <p:spPr/>
+        <p:txBody>
+          <a:bodyPr/>
+          <a:lstStyle/>
+          <a:p>
+            <a:r>
+              <a:rPr lang="ru-RU" dirty="0"/>
+              <a:t>Средняя скорость ветра</a:t>
+            </a:r>
+          </a:p>
+        </p:txBody>
+      </p:sp>
+      <mc:AlternateContent xmlns:mc="http://schemas.openxmlformats.org/markup-compatibility/2006">
+        <mc:Choice xmlns:a14="http://schemas.microsoft.com/office/drawing/2010/main" Requires="a14">
+          <p:sp>
+            <p:nvSpPr>
+              <p:cNvPr id="3" name="Объект 2">
+                <a:extLst>
+                  <a:ext uri="{FF2B5EF4-FFF2-40B4-BE49-F238E27FC236}">
+                    <a16:creationId xmlns:a16="http://schemas.microsoft.com/office/drawing/2014/main" id="{2C8C5460-670C-C87B-0673-70A272B92A3F}"/>
+                  </a:ext>
+                </a:extLst>
+              </p:cNvPr>
+              <p:cNvSpPr>
+                <a:spLocks noGrp="1"/>
+              </p:cNvSpPr>
+              <p:nvPr>
+                <p:ph idx="1"/>
+              </p:nvPr>
+            </p:nvSpPr>
+            <p:spPr/>
+            <p:txBody>
+              <a:bodyPr/>
+              <a:lstStyle/>
+              <a:p>
+                <a:pPr marL="36900" indent="0">
+                  <a:buNone/>
+                </a:pPr>
+                <a14:m>
+                  <m:oMathPara xmlns:m="http://schemas.openxmlformats.org/officeDocument/2006/math">
+                    <m:oMathParaPr>
+                      <m:jc m:val="centerGroup"/>
+                    </m:oMathParaPr>
+                    <m:oMath xmlns:m="http://schemas.openxmlformats.org/officeDocument/2006/math">
+                      <m:sSub>
+                        <m:sSubPr>
+                          <m:ctrlPr>
+                            <a:rPr lang="ru-RU" i="1" smtClean="0">
+                              <a:latin typeface="Cambria Math" panose="02040503050406030204" pitchFamily="18" charset="0"/>
+                            </a:rPr>
+                          </m:ctrlPr>
+                        </m:sSubPr>
+                        <m:e>
+                          <m:r>
+                            <a:rPr lang="en-US" b="0" i="1" smtClean="0">
+                              <a:latin typeface="Cambria Math" panose="02040503050406030204" pitchFamily="18" charset="0"/>
+                            </a:rPr>
+                            <m:t>𝑉</m:t>
+                          </m:r>
+                        </m:e>
+                        <m:sub>
+                          <m:r>
+                            <a:rPr lang="ru-RU" b="0" i="1" smtClean="0">
+                              <a:latin typeface="Cambria Math" panose="02040503050406030204" pitchFamily="18" charset="0"/>
+                            </a:rPr>
+                            <m:t>ср</m:t>
+                          </m:r>
+                        </m:sub>
+                      </m:sSub>
+                      <m:r>
+                        <a:rPr lang="ru-RU" b="0" i="1" smtClean="0">
+                          <a:latin typeface="Cambria Math" panose="02040503050406030204" pitchFamily="18" charset="0"/>
+                        </a:rPr>
+                        <m:t>=</m:t>
+                      </m:r>
+                      <m:d>
+                        <m:dPr>
+                          <m:ctrlPr>
+                            <a:rPr lang="ru-RU" b="0" i="1" smtClean="0">
+                              <a:latin typeface="Cambria Math" panose="02040503050406030204" pitchFamily="18" charset="0"/>
+                            </a:rPr>
+                          </m:ctrlPr>
+                        </m:dPr>
+                        <m:e>
+                          <m:r>
+                            <a:rPr lang="ru-RU" b="0" i="1" smtClean="0">
+                              <a:latin typeface="Cambria Math" panose="02040503050406030204" pitchFamily="18" charset="0"/>
+                            </a:rPr>
+                            <m:t>1,5..2</m:t>
+                          </m:r>
+                        </m:e>
+                      </m:d>
+                      <m:r>
+                        <a:rPr lang="ru-RU" b="0" i="1" smtClean="0">
+                          <a:latin typeface="Cambria Math" panose="02040503050406030204" pitchFamily="18" charset="0"/>
+                        </a:rPr>
+                        <m:t>∗</m:t>
+                      </m:r>
+                      <m:r>
+                        <a:rPr lang="en-US" b="0" i="1" smtClean="0">
+                          <a:latin typeface="Cambria Math" panose="02040503050406030204" pitchFamily="18" charset="0"/>
+                        </a:rPr>
+                        <m:t>𝑉</m:t>
+                      </m:r>
+                    </m:oMath>
+                  </m:oMathPara>
+                </a14:m>
+                <a:endParaRPr lang="ru-RU" dirty="0"/>
+              </a:p>
+              <a:p>
+                <a:pPr marL="36900" indent="0">
+                  <a:buNone/>
+                </a:pPr>
+                <a:r>
+                  <a:rPr lang="ru-RU" dirty="0"/>
+                  <a:t>Множители (1,5…2) выбираются в зависимости от расстояния. При расстоянии до точки наблюдения менее 10 км выбирается множитель 1,5, а при более 10 км – 2</a:t>
+                </a:r>
+              </a:p>
+              <a:p>
+                <a:pPr marL="36900" indent="0">
+                  <a:buNone/>
+                </a:pPr>
+                <a:r>
+                  <a:rPr lang="ru-RU" dirty="0">
+                    <a:ea typeface="Cambria Math" panose="02040503050406030204" pitchFamily="18" charset="0"/>
+                  </a:rPr>
+                  <a:t>Расстояние до точки наблюдения явно меньше 10 км </a:t>
+                </a:r>
+                <a14:m>
+                  <m:oMath xmlns:m="http://schemas.openxmlformats.org/officeDocument/2006/math">
+                    <m:r>
+                      <a:rPr lang="en-US" b="0" i="1" smtClean="0">
+                        <a:latin typeface="Cambria Math" panose="02040503050406030204" pitchFamily="18" charset="0"/>
+                        <a:ea typeface="Cambria Math" panose="02040503050406030204" pitchFamily="18" charset="0"/>
+                      </a:rPr>
+                      <m:t>→</m:t>
+                    </m:r>
+                    <m:r>
+                      <a:rPr lang="ru-RU" b="0" i="1" smtClean="0">
+                        <a:latin typeface="Cambria Math" panose="02040503050406030204" pitchFamily="18" charset="0"/>
+                        <a:ea typeface="Cambria Math" panose="02040503050406030204" pitchFamily="18" charset="0"/>
+                      </a:rPr>
+                      <m:t>1,5 ∗</m:t>
+                    </m:r>
+                    <m:r>
+                      <a:rPr lang="en-US" b="0" i="1" smtClean="0">
+                        <a:latin typeface="Cambria Math" panose="02040503050406030204" pitchFamily="18" charset="0"/>
+                        <a:ea typeface="Cambria Math" panose="02040503050406030204" pitchFamily="18" charset="0"/>
+                      </a:rPr>
+                      <m:t>𝑉</m:t>
+                    </m:r>
+                    <m:r>
+                      <a:rPr lang="en-US" b="0" i="1" smtClean="0">
+                        <a:latin typeface="Cambria Math" panose="02040503050406030204" pitchFamily="18" charset="0"/>
+                        <a:ea typeface="Cambria Math" panose="02040503050406030204" pitchFamily="18" charset="0"/>
+                      </a:rPr>
+                      <m:t>=6</m:t>
+                    </m:r>
+                    <m:r>
+                      <a:rPr lang="ru-RU" b="0" i="0" smtClean="0">
+                        <a:latin typeface="Cambria Math" panose="02040503050406030204" pitchFamily="18" charset="0"/>
+                        <a:ea typeface="Cambria Math" panose="02040503050406030204" pitchFamily="18" charset="0"/>
+                      </a:rPr>
+                      <m:t> км</m:t>
+                    </m:r>
+                    <m:r>
+                      <a:rPr lang="en-US" b="0" i="0" smtClean="0">
+                        <a:latin typeface="Cambria Math" panose="02040503050406030204" pitchFamily="18" charset="0"/>
+                        <a:ea typeface="Cambria Math" panose="02040503050406030204" pitchFamily="18" charset="0"/>
+                      </a:rPr>
+                      <m:t>/</m:t>
+                    </m:r>
+                    <m:r>
+                      <a:rPr lang="ru-RU" b="0" i="0" smtClean="0">
+                        <a:latin typeface="Cambria Math" panose="02040503050406030204" pitchFamily="18" charset="0"/>
+                        <a:ea typeface="Cambria Math" panose="02040503050406030204" pitchFamily="18" charset="0"/>
+                      </a:rPr>
+                      <m:t>ч</m:t>
+                    </m:r>
+                  </m:oMath>
+                </a14:m>
+                <a:endParaRPr lang="ru-RU" dirty="0"/>
+              </a:p>
+            </p:txBody>
+          </p:sp>
+        </mc:Choice>
+        <mc:Fallback>
+          <p:sp>
+            <p:nvSpPr>
+              <p:cNvPr id="3" name="Объект 2">
+                <a:extLst>
+                  <a:ext uri="{FF2B5EF4-FFF2-40B4-BE49-F238E27FC236}">
+                    <a16:creationId xmlns:a16="http://schemas.microsoft.com/office/drawing/2014/main" id="{2C8C5460-670C-C87B-0673-70A272B92A3F}"/>
+                  </a:ext>
+                </a:extLst>
+              </p:cNvPr>
+              <p:cNvSpPr>
+                <a:spLocks noGrp="1" noRot="1" noChangeAspect="1" noMove="1" noResize="1" noEditPoints="1" noAdjustHandles="1" noChangeArrowheads="1" noChangeShapeType="1" noTextEdit="1"/>
+              </p:cNvSpPr>
+              <p:nvPr>
+                <p:ph idx="1"/>
+              </p:nvPr>
+            </p:nvSpPr>
+            <p:spPr>
+              <a:blipFill>
+                <a:blip r:embed="rId2"/>
+                <a:stretch>
+                  <a:fillRect/>
+                </a:stretch>
+              </a:blipFill>
+            </p:spPr>
+            <p:txBody>
+              <a:bodyPr/>
+              <a:lstStyle/>
+              <a:p>
+                <a:r>
+                  <a:rPr lang="ru-RU">
+                    <a:noFill/>
+                  </a:rPr>
+                  <a:t> </a:t>
+                </a:r>
+              </a:p>
+            </p:txBody>
+          </p:sp>
+        </mc:Fallback>
+      </mc:AlternateContent>
+    </p:spTree>
+    <p:extLst>
+      <p:ext uri="{BB962C8B-B14F-4D97-AF65-F5344CB8AC3E}">
+        <p14:creationId xmlns:p14="http://schemas.microsoft.com/office/powerpoint/2010/main" val="2469009502"/>
+      </p:ext>
+    </p:extLst>
+  </p:cSld>
+  <p:clrMapOvr>
+    <a:masterClrMapping/>
+  </p:clrMapOvr>
+</p:sld>
+</file>
+
+<file path=ppt/slides/slide13.xml><?xml version="1.0" encoding="utf-8"?>
+<p:sld xmlns:a="http://schemas.openxmlformats.org/drawingml/2006/main" xmlns:r="http://schemas.openxmlformats.org/officeDocument/2006/relationships" xmlns:p="http://schemas.openxmlformats.org/presentationml/2006/main">
+  <p:cSld>
+    <p:spTree>
+      <p:nvGrpSpPr>
+        <p:cNvPr id="1" name=""/>
+        <p:cNvGrpSpPr/>
+        <p:nvPr/>
+      </p:nvGrpSpPr>
+      <p:grpSpPr>
+        <a:xfrm>
+          <a:off x="0" y="0"/>
+          <a:ext cx="0" cy="0"/>
+          <a:chOff x="0" y="0"/>
+          <a:chExt cx="0" cy="0"/>
+        </a:xfrm>
+      </p:grpSpPr>
+      <p:sp>
+        <p:nvSpPr>
+          <p:cNvPr id="2" name="Заголовок 1">
+            <a:extLst>
+              <a:ext uri="{FF2B5EF4-FFF2-40B4-BE49-F238E27FC236}">
+                <a16:creationId xmlns:a16="http://schemas.microsoft.com/office/drawing/2014/main" id="{59B72C80-CD5D-916B-B39A-BCBCD8199C4A}"/>
+              </a:ext>
+            </a:extLst>
+          </p:cNvPr>
+          <p:cNvSpPr>
+            <a:spLocks noGrp="1"/>
+          </p:cNvSpPr>
+          <p:nvPr>
+            <p:ph type="title"/>
+          </p:nvPr>
+        </p:nvSpPr>
+        <p:spPr/>
+        <p:txBody>
+          <a:bodyPr/>
+          <a:lstStyle/>
+          <a:p>
+            <a:r>
+              <a:rPr lang="ru-RU" dirty="0"/>
+              <a:t>Время подхода облака к узлу связи</a:t>
+            </a:r>
+          </a:p>
+        </p:txBody>
+      </p:sp>
+      <mc:AlternateContent xmlns:mc="http://schemas.openxmlformats.org/markup-compatibility/2006">
+        <mc:Choice xmlns:a14="http://schemas.microsoft.com/office/drawing/2010/main" Requires="a14">
+          <p:sp>
+            <p:nvSpPr>
+              <p:cNvPr id="3" name="Объект 2">
+                <a:extLst>
+                  <a:ext uri="{FF2B5EF4-FFF2-40B4-BE49-F238E27FC236}">
+                    <a16:creationId xmlns:a16="http://schemas.microsoft.com/office/drawing/2014/main" id="{5CC0B17A-D3CA-0D55-A7CE-7080569A44C8}"/>
+                  </a:ext>
+                </a:extLst>
+              </p:cNvPr>
+              <p:cNvSpPr>
+                <a:spLocks noGrp="1"/>
+              </p:cNvSpPr>
+              <p:nvPr>
+                <p:ph idx="1"/>
+              </p:nvPr>
+            </p:nvSpPr>
+            <p:spPr/>
+            <p:txBody>
+              <a:bodyPr/>
+              <a:lstStyle/>
+              <a:p>
+                <a:pPr marL="36900" indent="0">
+                  <a:buNone/>
+                </a:pPr>
+                <a14:m>
+                  <m:oMathPara xmlns:m="http://schemas.openxmlformats.org/officeDocument/2006/math">
+                    <m:oMathParaPr>
+                      <m:jc m:val="centerGroup"/>
+                    </m:oMathParaPr>
+                    <m:oMath xmlns:m="http://schemas.openxmlformats.org/officeDocument/2006/math">
+                      <m:sSub>
+                        <m:sSubPr>
+                          <m:ctrlPr>
+                            <a:rPr lang="ru-RU" i="1" smtClean="0">
+                              <a:latin typeface="Cambria Math" panose="02040503050406030204" pitchFamily="18" charset="0"/>
+                            </a:rPr>
+                          </m:ctrlPr>
+                        </m:sSubPr>
+                        <m:e>
+                          <m:r>
+                            <a:rPr lang="en-US" b="0" i="1" smtClean="0">
+                              <a:latin typeface="Cambria Math" panose="02040503050406030204" pitchFamily="18" charset="0"/>
+                            </a:rPr>
+                            <m:t>𝑡</m:t>
+                          </m:r>
+                        </m:e>
+                        <m:sub>
+                          <m:r>
+                            <a:rPr lang="ru-RU" b="0" i="1" smtClean="0">
+                              <a:latin typeface="Cambria Math" panose="02040503050406030204" pitchFamily="18" charset="0"/>
+                            </a:rPr>
+                            <m:t>подх</m:t>
+                          </m:r>
+                        </m:sub>
+                      </m:sSub>
+                      <m:r>
+                        <a:rPr lang="ru-RU" b="0" i="1" smtClean="0">
+                          <a:latin typeface="Cambria Math" panose="02040503050406030204" pitchFamily="18" charset="0"/>
+                        </a:rPr>
+                        <m:t>=</m:t>
+                      </m:r>
+                      <m:f>
+                        <m:fPr>
+                          <m:ctrlPr>
+                            <a:rPr lang="ru-RU" b="0" i="1" smtClean="0">
+                              <a:latin typeface="Cambria Math" panose="02040503050406030204" pitchFamily="18" charset="0"/>
+                            </a:rPr>
+                          </m:ctrlPr>
+                        </m:fPr>
+                        <m:num>
+                          <m:sSub>
+                            <m:sSubPr>
+                              <m:ctrlPr>
+                                <a:rPr lang="ru-RU" b="0" i="1" smtClean="0">
+                                  <a:latin typeface="Cambria Math" panose="02040503050406030204" pitchFamily="18" charset="0"/>
+                                </a:rPr>
+                              </m:ctrlPr>
+                            </m:sSubPr>
+                            <m:e>
+                              <m:r>
+                                <a:rPr lang="en-US" b="0" i="1" smtClean="0">
+                                  <a:latin typeface="Cambria Math" panose="02040503050406030204" pitchFamily="18" charset="0"/>
+                                </a:rPr>
+                                <m:t>𝑅</m:t>
+                              </m:r>
+                            </m:e>
+                            <m:sub>
+                              <m:r>
+                                <a:rPr lang="en-US" b="0" i="1" smtClean="0">
+                                  <a:latin typeface="Cambria Math" panose="02040503050406030204" pitchFamily="18" charset="0"/>
+                                </a:rPr>
+                                <m:t>3</m:t>
+                              </m:r>
+                            </m:sub>
+                          </m:sSub>
+                        </m:num>
+                        <m:den>
+                          <m:r>
+                            <a:rPr lang="en-US" b="0" i="1" smtClean="0">
+                              <a:latin typeface="Cambria Math" panose="02040503050406030204" pitchFamily="18" charset="0"/>
+                            </a:rPr>
+                            <m:t>60∗</m:t>
+                          </m:r>
+                          <m:sSub>
+                            <m:sSubPr>
+                              <m:ctrlPr>
+                                <a:rPr lang="ru-RU" b="0" i="1" smtClean="0">
+                                  <a:latin typeface="Cambria Math" panose="02040503050406030204" pitchFamily="18" charset="0"/>
+                                </a:rPr>
+                              </m:ctrlPr>
+                            </m:sSubPr>
+                            <m:e>
+                              <m:r>
+                                <a:rPr lang="en-US" b="0" i="1" smtClean="0">
+                                  <a:latin typeface="Cambria Math" panose="02040503050406030204" pitchFamily="18" charset="0"/>
+                                </a:rPr>
+                                <m:t>𝑉</m:t>
+                              </m:r>
+                            </m:e>
+                            <m:sub>
+                              <m:r>
+                                <a:rPr lang="ru-RU" b="0" i="1" smtClean="0">
+                                  <a:latin typeface="Cambria Math" panose="02040503050406030204" pitchFamily="18" charset="0"/>
+                                </a:rPr>
+                                <m:t>ср</m:t>
+                              </m:r>
+                            </m:sub>
+                          </m:sSub>
+                        </m:den>
+                      </m:f>
+                      <m:r>
+                        <a:rPr lang="ru-RU" b="0" i="1" smtClean="0">
+                          <a:latin typeface="Cambria Math" panose="02040503050406030204" pitchFamily="18" charset="0"/>
+                        </a:rPr>
+                        <m:t>=</m:t>
+                      </m:r>
+                      <m:f>
+                        <m:fPr>
+                          <m:ctrlPr>
+                            <a:rPr lang="ru-RU" b="0" i="1" smtClean="0">
+                              <a:latin typeface="Cambria Math" panose="02040503050406030204" pitchFamily="18" charset="0"/>
+                            </a:rPr>
+                          </m:ctrlPr>
+                        </m:fPr>
+                        <m:num>
+                          <m:r>
+                            <a:rPr lang="ru-RU" b="0" i="1" smtClean="0">
+                              <a:latin typeface="Cambria Math" panose="02040503050406030204" pitchFamily="18" charset="0"/>
+                            </a:rPr>
+                            <m:t>3200</m:t>
+                          </m:r>
+                        </m:num>
+                        <m:den>
+                          <m:r>
+                            <a:rPr lang="ru-RU" b="0" i="1" smtClean="0">
+                              <a:latin typeface="Cambria Math" panose="02040503050406030204" pitchFamily="18" charset="0"/>
+                            </a:rPr>
+                            <m:t>60∗6</m:t>
+                          </m:r>
+                        </m:den>
+                      </m:f>
+                      <m:r>
+                        <a:rPr lang="ru-RU" i="1">
+                          <a:latin typeface="Cambria Math" panose="02040503050406030204" pitchFamily="18" charset="0"/>
+                          <a:ea typeface="Cambria Math" panose="02040503050406030204" pitchFamily="18" charset="0"/>
+                        </a:rPr>
+                        <m:t>≈</m:t>
+                      </m:r>
+                      <m:r>
+                        <a:rPr lang="ru-RU" b="0" i="1" smtClean="0">
+                          <a:latin typeface="Cambria Math" panose="02040503050406030204" pitchFamily="18" charset="0"/>
+                          <a:ea typeface="Cambria Math" panose="02040503050406030204" pitchFamily="18" charset="0"/>
+                        </a:rPr>
+                        <m:t>8,8 мин.</m:t>
+                      </m:r>
+                    </m:oMath>
+                  </m:oMathPara>
+                </a14:m>
+                <a:endParaRPr lang="ru-RU" dirty="0"/>
+              </a:p>
+              <a:p>
+                <a:pPr marL="36900" indent="0" algn="ctr">
+                  <a:buNone/>
+                </a:pPr>
+                <a:r>
+                  <a:rPr lang="ru-RU" dirty="0"/>
+                  <a:t>где – расстояние от места </a:t>
+                </a:r>
+                <a:r>
+                  <a:rPr lang="ru-RU" dirty="0" err="1"/>
+                  <a:t>вылива</a:t>
+                </a:r>
+                <a:r>
+                  <a:rPr lang="ru-RU" dirty="0"/>
+                  <a:t> АХОВ, в метрах, </a:t>
+                </a:r>
+              </a:p>
+              <a:p>
+                <a:pPr marL="36900" indent="0" algn="ctr">
+                  <a:buNone/>
+                </a:pPr>
+                <a:r>
+                  <a:rPr lang="ru-RU" dirty="0"/>
+                  <a:t>60 – множитель для перевода секунд в минуты, </a:t>
+                </a:r>
+              </a:p>
+              <a:p>
+                <a:pPr marL="36900" indent="0" algn="ctr">
+                  <a:buNone/>
+                </a:pPr>
+                <a:r>
+                  <a:rPr lang="ru-RU" dirty="0"/>
+                  <a:t>V(ср) – средняя скорость переноса воздуха с АХОВ воздушным потоком, м/с.</a:t>
+                </a:r>
+              </a:p>
+            </p:txBody>
+          </p:sp>
+        </mc:Choice>
+        <mc:Fallback>
+          <p:sp>
+            <p:nvSpPr>
+              <p:cNvPr id="3" name="Объект 2">
+                <a:extLst>
+                  <a:ext uri="{FF2B5EF4-FFF2-40B4-BE49-F238E27FC236}">
+                    <a16:creationId xmlns:a16="http://schemas.microsoft.com/office/drawing/2014/main" id="{5CC0B17A-D3CA-0D55-A7CE-7080569A44C8}"/>
+                  </a:ext>
+                </a:extLst>
+              </p:cNvPr>
+              <p:cNvSpPr>
+                <a:spLocks noGrp="1" noRot="1" noChangeAspect="1" noMove="1" noResize="1" noEditPoints="1" noAdjustHandles="1" noChangeArrowheads="1" noChangeShapeType="1" noTextEdit="1"/>
+              </p:cNvSpPr>
+              <p:nvPr>
+                <p:ph idx="1"/>
+              </p:nvPr>
+            </p:nvSpPr>
+            <p:spPr>
+              <a:blipFill>
+                <a:blip r:embed="rId2"/>
+                <a:stretch>
+                  <a:fillRect/>
+                </a:stretch>
+              </a:blipFill>
+            </p:spPr>
+            <p:txBody>
+              <a:bodyPr/>
+              <a:lstStyle/>
+              <a:p>
+                <a:r>
+                  <a:rPr lang="ru-RU">
+                    <a:noFill/>
+                  </a:rPr>
+                  <a:t> </a:t>
+                </a:r>
+              </a:p>
+            </p:txBody>
+          </p:sp>
+        </mc:Fallback>
+      </mc:AlternateContent>
+    </p:spTree>
+    <p:extLst>
+      <p:ext uri="{BB962C8B-B14F-4D97-AF65-F5344CB8AC3E}">
+        <p14:creationId xmlns:p14="http://schemas.microsoft.com/office/powerpoint/2010/main" val="310205778"/>
+      </p:ext>
+    </p:extLst>
+  </p:cSld>
+  <p:clrMapOvr>
+    <a:masterClrMapping/>
+  </p:clrMapOvr>
+</p:sld>
+</file>
+
+<file path=ppt/slides/slide14.xml><?xml version="1.0" encoding="utf-8"?>
+<p:sld xmlns:a="http://schemas.openxmlformats.org/drawingml/2006/main" xmlns:r="http://schemas.openxmlformats.org/officeDocument/2006/relationships" xmlns:p="http://schemas.openxmlformats.org/presentationml/2006/main">
+  <p:cSld>
+    <p:spTree>
+      <p:nvGrpSpPr>
+        <p:cNvPr id="1" name=""/>
+        <p:cNvGrpSpPr/>
+        <p:nvPr/>
+      </p:nvGrpSpPr>
+      <p:grpSpPr>
+        <a:xfrm>
+          <a:off x="0" y="0"/>
+          <a:ext cx="0" cy="0"/>
+          <a:chOff x="0" y="0"/>
+          <a:chExt cx="0" cy="0"/>
+        </a:xfrm>
+      </p:grpSpPr>
+      <p:sp>
+        <p:nvSpPr>
+          <p:cNvPr id="2" name="Заголовок 1">
+            <a:extLst>
+              <a:ext uri="{FF2B5EF4-FFF2-40B4-BE49-F238E27FC236}">
+                <a16:creationId xmlns:a16="http://schemas.microsoft.com/office/drawing/2014/main" id="{99744CE7-8D41-FF98-7011-C98E904D0ED8}"/>
+              </a:ext>
+            </a:extLst>
+          </p:cNvPr>
+          <p:cNvSpPr>
+            <a:spLocks noGrp="1"/>
+          </p:cNvSpPr>
+          <p:nvPr>
+            <p:ph type="title"/>
+          </p:nvPr>
+        </p:nvSpPr>
+        <p:spPr/>
+        <p:txBody>
+          <a:bodyPr/>
+          <a:lstStyle/>
+          <a:p>
+            <a:r>
+              <a:rPr lang="ru-RU" dirty="0"/>
+              <a:t>Вывод</a:t>
+            </a:r>
+          </a:p>
+        </p:txBody>
+      </p:sp>
+      <p:sp>
+        <p:nvSpPr>
+          <p:cNvPr id="3" name="Объект 2">
+            <a:extLst>
+              <a:ext uri="{FF2B5EF4-FFF2-40B4-BE49-F238E27FC236}">
+                <a16:creationId xmlns:a16="http://schemas.microsoft.com/office/drawing/2014/main" id="{C2F5AFC1-BFD9-7789-4C40-46A4D6BD5162}"/>
+              </a:ext>
+            </a:extLst>
+          </p:cNvPr>
+          <p:cNvSpPr>
+            <a:spLocks noGrp="1"/>
+          </p:cNvSpPr>
+          <p:nvPr>
+            <p:ph idx="1"/>
+          </p:nvPr>
+        </p:nvSpPr>
+        <p:spPr/>
+        <p:txBody>
+          <a:bodyPr/>
+          <a:lstStyle/>
+          <a:p>
+            <a:r>
+              <a:rPr lang="ru-RU" dirty="0"/>
+              <a:t>За время подхода зараженного облака к предприятию, равное примерно 9 минутам при хорошо организованном оповещении о химической опасности можно подготовить работников к необходимости нахождения в химически опасной зоне, а также достаточно времени чтобы работников вывести за пределы опасной зоны (при скорости передвижения пешехода 5 км/ч возможно за 9 мин преодолеть расстояние почти в 750 м, что в </a:t>
+            </a:r>
+            <a:r>
+              <a:rPr lang="ru-RU" dirty="0">
+                <a:solidFill>
+                  <a:srgbClr val="FF0000"/>
+                </a:solidFill>
+              </a:rPr>
+              <a:t>ЧЕ???</a:t>
+            </a:r>
+          </a:p>
+        </p:txBody>
+      </p:sp>
+    </p:spTree>
+    <p:extLst>
+      <p:ext uri="{BB962C8B-B14F-4D97-AF65-F5344CB8AC3E}">
+        <p14:creationId xmlns:p14="http://schemas.microsoft.com/office/powerpoint/2010/main" val="1027220817"/>
+      </p:ext>
+    </p:extLst>
+  </p:cSld>
+  <p:clrMapOvr>
+    <a:masterClrMapping/>
+  </p:clrMapOvr>
+</p:sld>
+</file>
+
+<file path=ppt/slides/slide15.xml><?xml version="1.0" encoding="utf-8"?>
+<p:sld xmlns:a="http://schemas.openxmlformats.org/drawingml/2006/main" xmlns:r="http://schemas.openxmlformats.org/officeDocument/2006/relationships" xmlns:p="http://schemas.openxmlformats.org/presentationml/2006/main">
+  <p:cSld>
+    <p:spTree>
+      <p:nvGrpSpPr>
+        <p:cNvPr id="1" name=""/>
+        <p:cNvGrpSpPr/>
+        <p:nvPr/>
+      </p:nvGrpSpPr>
+      <p:grpSpPr>
+        <a:xfrm>
+          <a:off x="0" y="0"/>
+          <a:ext cx="0" cy="0"/>
+          <a:chOff x="0" y="0"/>
+          <a:chExt cx="0" cy="0"/>
+        </a:xfrm>
+      </p:grpSpPr>
+      <p:sp>
+        <p:nvSpPr>
+          <p:cNvPr id="2" name="Заголовок 1">
+            <a:extLst>
+              <a:ext uri="{FF2B5EF4-FFF2-40B4-BE49-F238E27FC236}">
+                <a16:creationId xmlns:a16="http://schemas.microsoft.com/office/drawing/2014/main" id="{C802C334-64D0-B4C8-C6BB-899EB812FA6E}"/>
+              </a:ext>
+            </a:extLst>
+          </p:cNvPr>
+          <p:cNvSpPr>
+            <a:spLocks noGrp="1"/>
+          </p:cNvSpPr>
+          <p:nvPr>
+            <p:ph type="title"/>
+          </p:nvPr>
+        </p:nvSpPr>
+        <p:spPr/>
+        <p:txBody>
+          <a:bodyPr/>
+          <a:lstStyle/>
+          <a:p>
+            <a:r>
+              <a:rPr lang="ru-RU" dirty="0"/>
+              <a:t>Время поражающего действия</a:t>
+            </a:r>
+          </a:p>
+        </p:txBody>
+      </p:sp>
+      <mc:AlternateContent xmlns:mc="http://schemas.openxmlformats.org/markup-compatibility/2006">
+        <mc:Choice xmlns:a14="http://schemas.microsoft.com/office/drawing/2010/main" Requires="a14">
+          <p:sp>
+            <p:nvSpPr>
+              <p:cNvPr id="3" name="Объект 2">
+                <a:extLst>
+                  <a:ext uri="{FF2B5EF4-FFF2-40B4-BE49-F238E27FC236}">
+                    <a16:creationId xmlns:a16="http://schemas.microsoft.com/office/drawing/2014/main" id="{5A6D5E97-E97B-E6CE-2B5E-47D547339E21}"/>
+                  </a:ext>
+                </a:extLst>
+              </p:cNvPr>
+              <p:cNvSpPr>
+                <a:spLocks noGrp="1"/>
+              </p:cNvSpPr>
+              <p:nvPr>
+                <p:ph idx="1"/>
+              </p:nvPr>
+            </p:nvSpPr>
+            <p:spPr/>
+            <p:txBody>
+              <a:bodyPr/>
+              <a:lstStyle/>
+              <a:p>
+                <a:pPr marL="36900" indent="0">
+                  <a:buNone/>
+                </a:pPr>
+                <a14:m>
+                  <m:oMathPara xmlns:m="http://schemas.openxmlformats.org/officeDocument/2006/math">
+                    <m:oMathParaPr>
+                      <m:jc m:val="centerGroup"/>
+                    </m:oMathParaPr>
+                    <m:oMath xmlns:m="http://schemas.openxmlformats.org/officeDocument/2006/math">
+                      <m:sSub>
+                        <m:sSubPr>
+                          <m:ctrlPr>
+                            <a:rPr lang="ru-RU" i="1" smtClean="0">
+                              <a:latin typeface="Cambria Math" panose="02040503050406030204" pitchFamily="18" charset="0"/>
+                            </a:rPr>
+                          </m:ctrlPr>
+                        </m:sSubPr>
+                        <m:e>
+                          <m:r>
+                            <a:rPr lang="en-US" b="0" i="1" smtClean="0">
+                              <a:latin typeface="Cambria Math" panose="02040503050406030204" pitchFamily="18" charset="0"/>
+                            </a:rPr>
+                            <m:t>𝑡</m:t>
+                          </m:r>
+                        </m:e>
+                        <m:sub>
+                          <m:r>
+                            <a:rPr lang="ru-RU" b="0" i="1" smtClean="0">
+                              <a:latin typeface="Cambria Math" panose="02040503050406030204" pitchFamily="18" charset="0"/>
+                            </a:rPr>
+                            <m:t>исп</m:t>
+                          </m:r>
+                        </m:sub>
+                      </m:sSub>
+                      <m:r>
+                        <a:rPr lang="en-US" b="0" i="1" smtClean="0">
+                          <a:latin typeface="Cambria Math" panose="02040503050406030204" pitchFamily="18" charset="0"/>
+                        </a:rPr>
+                        <m:t>=</m:t>
+                      </m:r>
+                      <m:sSub>
+                        <m:sSubPr>
+                          <m:ctrlPr>
+                            <a:rPr lang="en-US" b="0" i="1" smtClean="0">
+                              <a:latin typeface="Cambria Math" panose="02040503050406030204" pitchFamily="18" charset="0"/>
+                            </a:rPr>
+                          </m:ctrlPr>
+                        </m:sSubPr>
+                        <m:e>
+                          <m:r>
+                            <a:rPr lang="en-US" b="0" i="1" smtClean="0">
+                              <a:latin typeface="Cambria Math" panose="02040503050406030204" pitchFamily="18" charset="0"/>
+                            </a:rPr>
+                            <m:t>𝑡</m:t>
+                          </m:r>
+                        </m:e>
+                        <m:sub>
+                          <m:r>
+                            <a:rPr lang="ru-RU" b="0" i="1" smtClean="0">
+                              <a:latin typeface="Cambria Math" panose="02040503050406030204" pitchFamily="18" charset="0"/>
+                            </a:rPr>
+                            <m:t>пораж</m:t>
+                          </m:r>
+                        </m:sub>
+                      </m:sSub>
+                      <m:r>
+                        <a:rPr lang="ru-RU" b="0" i="1" smtClean="0">
+                          <a:latin typeface="Cambria Math" panose="02040503050406030204" pitchFamily="18" charset="0"/>
+                        </a:rPr>
+                        <m:t>=1 ч</m:t>
+                      </m:r>
+                    </m:oMath>
+                  </m:oMathPara>
+                </a14:m>
+                <a:endParaRPr lang="ru-RU" dirty="0"/>
+              </a:p>
+              <a:p>
+                <a:pPr marL="36900" indent="0" algn="ctr">
+                  <a:buNone/>
+                </a:pPr>
+                <a:r>
+                  <a:rPr lang="ru-RU" dirty="0"/>
+                  <a:t>При скорости ветра более 1 м/с берем поправку и получаем:</a:t>
+                </a:r>
+              </a:p>
+              <a:p>
+                <a:pPr marL="36900" indent="0" algn="ctr">
+                  <a:buNone/>
+                </a:pPr>
+                <a14:m>
+                  <m:oMathPara xmlns:m="http://schemas.openxmlformats.org/officeDocument/2006/math">
+                    <m:oMathParaPr>
+                      <m:jc m:val="centerGroup"/>
+                    </m:oMathParaPr>
+                    <m:oMath xmlns:m="http://schemas.openxmlformats.org/officeDocument/2006/math">
+                      <m:sSub>
+                        <m:sSubPr>
+                          <m:ctrlPr>
+                            <a:rPr lang="ru-RU" i="1" smtClean="0">
+                              <a:latin typeface="Cambria Math" panose="02040503050406030204" pitchFamily="18" charset="0"/>
+                            </a:rPr>
+                          </m:ctrlPr>
+                        </m:sSubPr>
+                        <m:e>
+                          <m:r>
+                            <a:rPr lang="en-US" b="0" i="1" smtClean="0">
+                              <a:latin typeface="Cambria Math" panose="02040503050406030204" pitchFamily="18" charset="0"/>
+                            </a:rPr>
+                            <m:t>𝑡</m:t>
+                          </m:r>
+                        </m:e>
+                        <m:sub>
+                          <m:r>
+                            <a:rPr lang="ru-RU" b="0" i="1" smtClean="0">
+                              <a:latin typeface="Cambria Math" panose="02040503050406030204" pitchFamily="18" charset="0"/>
+                            </a:rPr>
+                            <m:t>исп</m:t>
+                          </m:r>
+                        </m:sub>
+                      </m:sSub>
+                      <m:r>
+                        <a:rPr lang="en-US" b="0" i="1" smtClean="0">
+                          <a:latin typeface="Cambria Math" panose="02040503050406030204" pitchFamily="18" charset="0"/>
+                        </a:rPr>
+                        <m:t>=</m:t>
+                      </m:r>
+                      <m:sSub>
+                        <m:sSubPr>
+                          <m:ctrlPr>
+                            <a:rPr lang="en-US" b="0" i="1" smtClean="0">
+                              <a:latin typeface="Cambria Math" panose="02040503050406030204" pitchFamily="18" charset="0"/>
+                            </a:rPr>
+                          </m:ctrlPr>
+                        </m:sSubPr>
+                        <m:e>
+                          <m:r>
+                            <a:rPr lang="en-US" b="0" i="1" smtClean="0">
+                              <a:latin typeface="Cambria Math" panose="02040503050406030204" pitchFamily="18" charset="0"/>
+                            </a:rPr>
+                            <m:t>𝑡</m:t>
+                          </m:r>
+                        </m:e>
+                        <m:sub>
+                          <m:r>
+                            <a:rPr lang="ru-RU" b="0" i="1" smtClean="0">
+                              <a:latin typeface="Cambria Math" panose="02040503050406030204" pitchFamily="18" charset="0"/>
+                            </a:rPr>
+                            <m:t>пораж</m:t>
+                          </m:r>
+                        </m:sub>
+                      </m:sSub>
+                      <m:r>
+                        <a:rPr lang="ru-RU" b="0" i="1" smtClean="0">
+                          <a:latin typeface="Cambria Math" panose="02040503050406030204" pitchFamily="18" charset="0"/>
+                        </a:rPr>
+                        <m:t>=1 ч</m:t>
+                      </m:r>
+                      <m:r>
+                        <a:rPr lang="ru-RU" b="0" i="1" smtClean="0">
+                          <a:latin typeface="Cambria Math" panose="02040503050406030204" pitchFamily="18" charset="0"/>
+                        </a:rPr>
+                        <m:t> ∗0,32=19,2 минуты</m:t>
+                      </m:r>
+                    </m:oMath>
+                  </m:oMathPara>
+                </a14:m>
+                <a:endParaRPr lang="ru-RU" dirty="0"/>
+              </a:p>
+            </p:txBody>
+          </p:sp>
+        </mc:Choice>
+        <mc:Fallback>
+          <p:sp>
+            <p:nvSpPr>
+              <p:cNvPr id="3" name="Объект 2">
+                <a:extLst>
+                  <a:ext uri="{FF2B5EF4-FFF2-40B4-BE49-F238E27FC236}">
+                    <a16:creationId xmlns:a16="http://schemas.microsoft.com/office/drawing/2014/main" id="{5A6D5E97-E97B-E6CE-2B5E-47D547339E21}"/>
+                  </a:ext>
+                </a:extLst>
+              </p:cNvPr>
+              <p:cNvSpPr>
+                <a:spLocks noGrp="1" noRot="1" noChangeAspect="1" noMove="1" noResize="1" noEditPoints="1" noAdjustHandles="1" noChangeArrowheads="1" noChangeShapeType="1" noTextEdit="1"/>
+              </p:cNvSpPr>
+              <p:nvPr>
+                <p:ph idx="1"/>
+              </p:nvPr>
+            </p:nvSpPr>
+            <p:spPr>
+              <a:blipFill>
+                <a:blip r:embed="rId2"/>
+                <a:stretch>
+                  <a:fillRect/>
+                </a:stretch>
+              </a:blipFill>
+            </p:spPr>
+            <p:txBody>
+              <a:bodyPr/>
+              <a:lstStyle/>
+              <a:p>
+                <a:r>
+                  <a:rPr lang="ru-RU">
+                    <a:noFill/>
+                  </a:rPr>
+                  <a:t> </a:t>
+                </a:r>
+              </a:p>
+            </p:txBody>
+          </p:sp>
+        </mc:Fallback>
+      </mc:AlternateContent>
+    </p:spTree>
+    <p:extLst>
+      <p:ext uri="{BB962C8B-B14F-4D97-AF65-F5344CB8AC3E}">
+        <p14:creationId xmlns:p14="http://schemas.microsoft.com/office/powerpoint/2010/main" val="2799772074"/>
+      </p:ext>
+    </p:extLst>
+  </p:cSld>
+  <p:clrMapOvr>
+    <a:masterClrMapping/>
+  </p:clrMapOvr>
+</p:sld>
+</file>
+
+<file path=ppt/slides/slide16.xml><?xml version="1.0" encoding="utf-8"?>
+<p:sld xmlns:a="http://schemas.openxmlformats.org/drawingml/2006/main" xmlns:r="http://schemas.openxmlformats.org/officeDocument/2006/relationships" xmlns:p="http://schemas.openxmlformats.org/presentationml/2006/main">
+  <p:cSld>
+    <p:spTree>
+      <p:nvGrpSpPr>
+        <p:cNvPr id="1" name=""/>
+        <p:cNvGrpSpPr/>
+        <p:nvPr/>
+      </p:nvGrpSpPr>
+      <p:grpSpPr>
+        <a:xfrm>
+          <a:off x="0" y="0"/>
+          <a:ext cx="0" cy="0"/>
+          <a:chOff x="0" y="0"/>
+          <a:chExt cx="0" cy="0"/>
+        </a:xfrm>
+      </p:grpSpPr>
+      <p:sp>
+        <p:nvSpPr>
+          <p:cNvPr id="2" name="Заголовок 1">
+            <a:extLst>
+              <a:ext uri="{FF2B5EF4-FFF2-40B4-BE49-F238E27FC236}">
+                <a16:creationId xmlns:a16="http://schemas.microsoft.com/office/drawing/2014/main" id="{CA6F6842-67B3-3A37-C6C4-B79673C2A0DF}"/>
+              </a:ext>
+            </a:extLst>
+          </p:cNvPr>
+          <p:cNvSpPr>
+            <a:spLocks noGrp="1"/>
+          </p:cNvSpPr>
+          <p:nvPr>
+            <p:ph type="title"/>
+          </p:nvPr>
+        </p:nvSpPr>
+        <p:spPr/>
+        <p:txBody>
+          <a:bodyPr/>
+          <a:lstStyle/>
+          <a:p>
+            <a:r>
+              <a:rPr lang="ru-RU" dirty="0"/>
+              <a:t>Вывод</a:t>
+            </a:r>
+          </a:p>
+        </p:txBody>
+      </p:sp>
+      <p:sp>
+        <p:nvSpPr>
+          <p:cNvPr id="3" name="Объект 2">
+            <a:extLst>
+              <a:ext uri="{FF2B5EF4-FFF2-40B4-BE49-F238E27FC236}">
+                <a16:creationId xmlns:a16="http://schemas.microsoft.com/office/drawing/2014/main" id="{AB6A01FE-4DDD-A0AD-C6BD-731CB9EB17E1}"/>
+              </a:ext>
+            </a:extLst>
+          </p:cNvPr>
+          <p:cNvSpPr>
+            <a:spLocks noGrp="1"/>
+          </p:cNvSpPr>
+          <p:nvPr>
+            <p:ph idx="1"/>
+          </p:nvPr>
+        </p:nvSpPr>
+        <p:spPr/>
+        <p:txBody>
+          <a:bodyPr/>
+          <a:lstStyle/>
+          <a:p>
+            <a:r>
+              <a:rPr lang="ru-RU" dirty="0"/>
+              <a:t>Почти через 20 мин после начала химического заражения на предприятии уровень химического заражения должен уменьшится до нормального. Но перед возвращением работников из места временного размещения вне зоны химического заражения (или выхода из герметизированных помещений на предприятии) следует провести химическую разведку местности и помещений и при необходимости провести их дегазацию, силами нештатных </a:t>
+            </a:r>
+            <a:r>
+              <a:rPr lang="ru-RU" dirty="0" err="1"/>
+              <a:t>аварийноспасательных</a:t>
+            </a:r>
+            <a:r>
+              <a:rPr lang="ru-RU" dirty="0"/>
+              <a:t> формирований предприятия.</a:t>
+            </a:r>
+          </a:p>
+        </p:txBody>
+      </p:sp>
+    </p:spTree>
+    <p:extLst>
+      <p:ext uri="{BB962C8B-B14F-4D97-AF65-F5344CB8AC3E}">
+        <p14:creationId xmlns:p14="http://schemas.microsoft.com/office/powerpoint/2010/main" val="1263691229"/>
+      </p:ext>
+    </p:extLst>
+  </p:cSld>
+  <p:clrMapOvr>
+    <a:masterClrMapping/>
+  </p:clrMapOvr>
+</p:sld>
+</file>
+
+<file path=ppt/slides/slide17.xml><?xml version="1.0" encoding="utf-8"?>
+<p:sld xmlns:a="http://schemas.openxmlformats.org/drawingml/2006/main" xmlns:r="http://schemas.openxmlformats.org/officeDocument/2006/relationships" xmlns:p="http://schemas.openxmlformats.org/presentationml/2006/main">
+  <p:cSld>
+    <p:spTree>
+      <p:nvGrpSpPr>
+        <p:cNvPr id="1" name=""/>
+        <p:cNvGrpSpPr/>
+        <p:nvPr/>
+      </p:nvGrpSpPr>
+      <p:grpSpPr>
+        <a:xfrm>
+          <a:off x="0" y="0"/>
+          <a:ext cx="0" cy="0"/>
+          <a:chOff x="0" y="0"/>
+          <a:chExt cx="0" cy="0"/>
+        </a:xfrm>
+      </p:grpSpPr>
+      <p:sp>
+        <p:nvSpPr>
+          <p:cNvPr id="2" name="Заголовок 1">
+            <a:extLst>
+              <a:ext uri="{FF2B5EF4-FFF2-40B4-BE49-F238E27FC236}">
+                <a16:creationId xmlns:a16="http://schemas.microsoft.com/office/drawing/2014/main" id="{DB6C8A02-7781-F035-48C0-1A5D68B818FA}"/>
+              </a:ext>
+            </a:extLst>
+          </p:cNvPr>
+          <p:cNvSpPr>
+            <a:spLocks noGrp="1"/>
+          </p:cNvSpPr>
+          <p:nvPr>
+            <p:ph type="title"/>
+          </p:nvPr>
+        </p:nvSpPr>
+        <p:spPr/>
+        <p:txBody>
+          <a:bodyPr/>
+          <a:lstStyle/>
+          <a:p>
+            <a:r>
+              <a:rPr lang="ru-RU" dirty="0"/>
+              <a:t>Возможные потери персонала</a:t>
+            </a:r>
+          </a:p>
+        </p:txBody>
+      </p:sp>
+      <mc:AlternateContent xmlns:mc="http://schemas.openxmlformats.org/markup-compatibility/2006">
+        <mc:Choice xmlns:a14="http://schemas.microsoft.com/office/drawing/2010/main" Requires="a14">
+          <p:sp>
+            <p:nvSpPr>
+              <p:cNvPr id="3" name="Объект 2">
+                <a:extLst>
+                  <a:ext uri="{FF2B5EF4-FFF2-40B4-BE49-F238E27FC236}">
+                    <a16:creationId xmlns:a16="http://schemas.microsoft.com/office/drawing/2014/main" id="{7FAD03CF-128D-DD88-82F6-70F3E9909E84}"/>
+                  </a:ext>
+                </a:extLst>
+              </p:cNvPr>
+              <p:cNvSpPr>
+                <a:spLocks noGrp="1"/>
+              </p:cNvSpPr>
+              <p:nvPr>
+                <p:ph idx="1"/>
+              </p:nvPr>
+            </p:nvSpPr>
+            <p:spPr/>
+            <p:txBody>
+              <a:bodyPr>
+                <a:normAutofit fontScale="70000" lnSpcReduction="20000"/>
+              </a:bodyPr>
+              <a:lstStyle/>
+              <a:p>
+                <a:pPr marL="36900" indent="0">
+                  <a:buNone/>
+                </a:pPr>
+                <a:r>
+                  <a:rPr lang="ru-RU" dirty="0"/>
+                  <a:t>Потери персонала объекта связи при их обеспеченности средствами индивидуальной защиты органов дыхания от сероводорода – 45% (по условию) и при нахождении работников в герметизированных помещениях здания (или простейших укрытиях) составят 28,5%. </a:t>
+                </a:r>
+              </a:p>
+              <a:p>
+                <a:pPr marL="36900" indent="0">
+                  <a:buNone/>
+                </a:pPr>
+                <a:r>
+                  <a:rPr lang="ru-RU" dirty="0"/>
+                  <a:t>При численности работающей смены на объекте связи 55 человек, общие потери составят: </a:t>
+                </a:r>
+              </a:p>
+              <a:p>
+                <a:pPr marL="36900" indent="0">
+                  <a:buNone/>
+                </a:pPr>
+                <a14:m>
+                  <m:oMathPara xmlns:m="http://schemas.openxmlformats.org/officeDocument/2006/math">
+                    <m:oMathParaPr>
+                      <m:jc m:val="centerGroup"/>
+                    </m:oMathParaPr>
+                    <m:oMath xmlns:m="http://schemas.openxmlformats.org/officeDocument/2006/math">
+                      <m:r>
+                        <a:rPr lang="ru-RU" b="0" i="1" smtClean="0">
+                          <a:latin typeface="Cambria Math" panose="02040503050406030204" pitchFamily="18" charset="0"/>
+                        </a:rPr>
+                        <m:t>П=55∗0,285=15 человек</m:t>
+                      </m:r>
+                    </m:oMath>
+                  </m:oMathPara>
+                </a14:m>
+                <a:endParaRPr lang="ru-RU" dirty="0"/>
+              </a:p>
+              <a:p>
+                <a:pPr marL="36900" indent="0">
+                  <a:buNone/>
+                </a:pPr>
+                <a:endParaRPr lang="ru-RU" dirty="0"/>
+              </a:p>
+              <a:p>
+                <a:pPr marL="36900" indent="0">
+                  <a:buNone/>
+                </a:pPr>
+                <a:r>
+                  <a:rPr lang="ru-RU" dirty="0"/>
+                  <a:t>Ориентировочная структура по видам поражения людей от составляет: </a:t>
+                </a:r>
+              </a:p>
+              <a:p>
+                <a:pPr marL="36900" indent="0">
+                  <a:buNone/>
+                </a:pPr>
+                <a:r>
+                  <a:rPr lang="ru-RU" dirty="0"/>
+                  <a:t>● поражения легкой степени – 25%; </a:t>
+                </a:r>
+              </a:p>
+              <a:p>
+                <a:pPr marL="36900" indent="0">
+                  <a:buNone/>
+                </a:pPr>
+                <a:r>
+                  <a:rPr lang="ru-RU" dirty="0"/>
+                  <a:t>● средней и тяжелой степени – 40%; </a:t>
+                </a:r>
+              </a:p>
+              <a:p>
+                <a:pPr marL="36900" indent="0">
+                  <a:buNone/>
+                </a:pPr>
+                <a:r>
+                  <a:rPr lang="ru-RU" dirty="0"/>
+                  <a:t>● со смертельным исходом – 35%. </a:t>
+                </a:r>
+              </a:p>
+              <a:p>
+                <a:pPr marL="36900" indent="0">
+                  <a:buNone/>
+                </a:pPr>
+                <a:r>
+                  <a:rPr lang="ru-RU" dirty="0"/>
+                  <a:t>Потери по степени тяжести распределяться следующим образом: </a:t>
+                </a:r>
+              </a:p>
+              <a:p>
+                <a:pPr marL="36900" indent="0">
+                  <a:buNone/>
+                </a:pPr>
+                <a:r>
+                  <a:rPr lang="ru-RU" dirty="0"/>
+                  <a:t>поражения легкой степени – 15 чел. × 0,25 ≈ 4 чел. </a:t>
+                </a:r>
+              </a:p>
+              <a:p>
+                <a:pPr marL="36900" indent="0">
+                  <a:buNone/>
+                </a:pPr>
+                <a:r>
+                  <a:rPr lang="ru-RU" dirty="0"/>
+                  <a:t>поражения средней и тяжелой степени – 15 чел. × 0,4 ≈ 6 чел. </a:t>
+                </a:r>
+              </a:p>
+              <a:p>
+                <a:pPr marL="36900" indent="0">
+                  <a:buNone/>
+                </a:pPr>
+                <a:r>
+                  <a:rPr lang="ru-RU" dirty="0"/>
+                  <a:t>поражения со смертельным исходом – 15 чел. × 0,35 ≈ 5 чел.</a:t>
+                </a:r>
+              </a:p>
+            </p:txBody>
+          </p:sp>
+        </mc:Choice>
+        <mc:Fallback>
+          <p:sp>
+            <p:nvSpPr>
+              <p:cNvPr id="3" name="Объект 2">
+                <a:extLst>
+                  <a:ext uri="{FF2B5EF4-FFF2-40B4-BE49-F238E27FC236}">
+                    <a16:creationId xmlns:a16="http://schemas.microsoft.com/office/drawing/2014/main" id="{7FAD03CF-128D-DD88-82F6-70F3E9909E84}"/>
+                  </a:ext>
+                </a:extLst>
+              </p:cNvPr>
+              <p:cNvSpPr>
+                <a:spLocks noGrp="1" noRot="1" noChangeAspect="1" noMove="1" noResize="1" noEditPoints="1" noAdjustHandles="1" noChangeArrowheads="1" noChangeShapeType="1" noTextEdit="1"/>
+              </p:cNvSpPr>
+              <p:nvPr>
+                <p:ph idx="1"/>
+              </p:nvPr>
+            </p:nvSpPr>
+            <p:spPr>
+              <a:blipFill>
+                <a:blip r:embed="rId2"/>
+                <a:stretch>
+                  <a:fillRect/>
+                </a:stretch>
+              </a:blipFill>
+            </p:spPr>
+            <p:txBody>
+              <a:bodyPr/>
+              <a:lstStyle/>
+              <a:p>
+                <a:r>
+                  <a:rPr lang="ru-RU">
+                    <a:noFill/>
+                  </a:rPr>
+                  <a:t> </a:t>
+                </a:r>
+              </a:p>
+            </p:txBody>
+          </p:sp>
+        </mc:Fallback>
+      </mc:AlternateContent>
+    </p:spTree>
+    <p:extLst>
+      <p:ext uri="{BB962C8B-B14F-4D97-AF65-F5344CB8AC3E}">
+        <p14:creationId xmlns:p14="http://schemas.microsoft.com/office/powerpoint/2010/main" val="3487554731"/>
+      </p:ext>
+    </p:extLst>
+  </p:cSld>
+  <p:clrMapOvr>
+    <a:masterClrMapping/>
+  </p:clrMapOvr>
+</p:sld>
+</file>
+
+<file path=ppt/slides/slide18.xml><?xml version="1.0" encoding="utf-8"?>
+<p:sld xmlns:a="http://schemas.openxmlformats.org/drawingml/2006/main" xmlns:r="http://schemas.openxmlformats.org/officeDocument/2006/relationships" xmlns:p="http://schemas.openxmlformats.org/presentationml/2006/main">
+  <p:cSld>
+    <p:spTree>
+      <p:nvGrpSpPr>
+        <p:cNvPr id="1" name=""/>
+        <p:cNvGrpSpPr/>
+        <p:nvPr/>
+      </p:nvGrpSpPr>
+      <p:grpSpPr>
+        <a:xfrm>
+          <a:off x="0" y="0"/>
+          <a:ext cx="0" cy="0"/>
+          <a:chOff x="0" y="0"/>
+          <a:chExt cx="0" cy="0"/>
+        </a:xfrm>
+      </p:grpSpPr>
+      <p:sp>
+        <p:nvSpPr>
+          <p:cNvPr id="2" name="Заголовок 1">
+            <a:extLst>
+              <a:ext uri="{FF2B5EF4-FFF2-40B4-BE49-F238E27FC236}">
+                <a16:creationId xmlns:a16="http://schemas.microsoft.com/office/drawing/2014/main" id="{12FA9CDD-0080-76AE-382C-DE509307C754}"/>
+              </a:ext>
+            </a:extLst>
+          </p:cNvPr>
+          <p:cNvSpPr>
+            <a:spLocks noGrp="1"/>
+          </p:cNvSpPr>
+          <p:nvPr>
+            <p:ph type="title"/>
+          </p:nvPr>
+        </p:nvSpPr>
+        <p:spPr/>
+        <p:txBody>
+          <a:bodyPr/>
+          <a:lstStyle/>
+          <a:p>
+            <a:r>
+              <a:rPr lang="ru-RU" dirty="0"/>
+              <a:t>Вывод</a:t>
+            </a:r>
+          </a:p>
+        </p:txBody>
+      </p:sp>
+      <p:sp>
+        <p:nvSpPr>
+          <p:cNvPr id="3" name="Объект 2">
+            <a:extLst>
+              <a:ext uri="{FF2B5EF4-FFF2-40B4-BE49-F238E27FC236}">
+                <a16:creationId xmlns:a16="http://schemas.microsoft.com/office/drawing/2014/main" id="{FA8113F1-1D2B-8842-D36A-63EB02B75CF7}"/>
+              </a:ext>
+            </a:extLst>
+          </p:cNvPr>
+          <p:cNvSpPr>
+            <a:spLocks noGrp="1"/>
+          </p:cNvSpPr>
+          <p:nvPr>
+            <p:ph idx="1"/>
+          </p:nvPr>
+        </p:nvSpPr>
+        <p:spPr/>
+        <p:txBody>
+          <a:bodyPr/>
+          <a:lstStyle/>
+          <a:p>
+            <a:r>
+              <a:rPr lang="ru-RU" dirty="0"/>
+              <a:t>Общие потери при воздействии химического заражения от сероводорода на предприятии составят 12 чел. При этом, 4 чел. получат поражения легкой степени и им возможно оказание первой помощи непосредственно на предприятии; 6 чел. получат поражения средней и тяжелой степени – им необходимо оказание первой помощи в лечебных учреждениях; 5 чел. получат поражения со смертельным исходом. На предприятии останутся работоспособными 40 чел., которые способны провести мероприятия по ликвидации последствий химического заражения и продолжить производственную деятельность.</a:t>
+            </a:r>
+          </a:p>
+        </p:txBody>
+      </p:sp>
+    </p:spTree>
+    <p:extLst>
+      <p:ext uri="{BB962C8B-B14F-4D97-AF65-F5344CB8AC3E}">
+        <p14:creationId xmlns:p14="http://schemas.microsoft.com/office/powerpoint/2010/main" val="2774418959"/>
+      </p:ext>
+    </p:extLst>
+  </p:cSld>
+  <p:clrMapOvr>
+    <a:masterClrMapping/>
+  </p:clrMapOvr>
+</p:sld>
+</file>
+
+<file path=ppt/slides/slide19.xml><?xml version="1.0" encoding="utf-8"?>
+<p:sld xmlns:a="http://schemas.openxmlformats.org/drawingml/2006/main" xmlns:r="http://schemas.openxmlformats.org/officeDocument/2006/relationships" xmlns:p="http://schemas.openxmlformats.org/presentationml/2006/main">
+  <p:cSld>
+    <p:bg>
+      <p:bgPr>
+        <a:blipFill rotWithShape="1">
+          <a:blip r:embed="rId2">
+            <a:duotone>
+              <a:schemeClr val="bg2">
+                <a:shade val="80000"/>
+                <a:lumMod val="80000"/>
+              </a:schemeClr>
+              <a:schemeClr val="bg2">
+                <a:tint val="98000"/>
+              </a:schemeClr>
+            </a:duotone>
+          </a:blip>
+          <a:stretch/>
+        </a:blipFill>
+        <a:effectLst/>
+      </p:bgPr>
+    </p:bg>
+    <p:spTree>
+      <p:nvGrpSpPr>
+        <p:cNvPr id="1" name=""/>
+        <p:cNvGrpSpPr/>
+        <p:nvPr/>
+      </p:nvGrpSpPr>
+      <p:grpSpPr>
+        <a:xfrm>
+          <a:off x="0" y="0"/>
+          <a:ext cx="0" cy="0"/>
+          <a:chOff x="0" y="0"/>
+          <a:chExt cx="0" cy="0"/>
+        </a:xfrm>
+      </p:grpSpPr>
+      <p:sp>
+        <p:nvSpPr>
+          <p:cNvPr id="2" name="Заголовок 1">
+            <a:extLst>
+              <a:ext uri="{FF2B5EF4-FFF2-40B4-BE49-F238E27FC236}">
+                <a16:creationId xmlns:a16="http://schemas.microsoft.com/office/drawing/2014/main" id="{3126BCE1-0165-7B08-E56C-8B16F9E06CB5}"/>
+              </a:ext>
+            </a:extLst>
+          </p:cNvPr>
+          <p:cNvSpPr>
+            <a:spLocks noGrp="1"/>
+          </p:cNvSpPr>
+          <p:nvPr>
+            <p:ph type="title"/>
+          </p:nvPr>
+        </p:nvSpPr>
+        <p:spPr>
+          <a:xfrm>
+            <a:off x="913795" y="609600"/>
+            <a:ext cx="5978072" cy="1329596"/>
+          </a:xfrm>
+        </p:spPr>
+        <p:txBody>
+          <a:bodyPr>
+            <a:normAutofit/>
+          </a:bodyPr>
+          <a:lstStyle/>
+          <a:p>
+            <a:pPr>
+              <a:lnSpc>
+                <a:spcPct val="90000"/>
+              </a:lnSpc>
+            </a:pPr>
+            <a:r>
+              <a:rPr lang="ru-RU" sz="3400"/>
+              <a:t>Мероприятия по снижению тяжести последствий</a:t>
+            </a:r>
+          </a:p>
+        </p:txBody>
+      </p:sp>
+      <p:sp>
+        <p:nvSpPr>
+          <p:cNvPr id="3" name="Объект 2">
+            <a:extLst>
+              <a:ext uri="{FF2B5EF4-FFF2-40B4-BE49-F238E27FC236}">
+                <a16:creationId xmlns:a16="http://schemas.microsoft.com/office/drawing/2014/main" id="{9EDA8626-3D70-CAFB-1549-1E7495F8204F}"/>
+              </a:ext>
+            </a:extLst>
+          </p:cNvPr>
+          <p:cNvSpPr>
+            <a:spLocks noGrp="1"/>
+          </p:cNvSpPr>
+          <p:nvPr>
+            <p:ph idx="1"/>
+          </p:nvPr>
+        </p:nvSpPr>
+        <p:spPr>
+          <a:xfrm>
+            <a:off x="913795" y="2127623"/>
+            <a:ext cx="5978072" cy="3567225"/>
+          </a:xfrm>
+        </p:spPr>
+        <p:txBody>
+          <a:bodyPr anchor="ctr">
+            <a:normAutofit/>
+          </a:bodyPr>
+          <a:lstStyle/>
+          <a:p>
+            <a:pPr>
+              <a:buClr>
+                <a:srgbClr val="C05656"/>
+              </a:buClr>
+            </a:pPr>
+            <a:r>
+              <a:rPr lang="ru-RU" dirty="0"/>
+              <a:t>Уменьшить количество АХОВ на предприятии (площадь разлива в 20 раз больше количества АХОВ)</a:t>
+            </a:r>
+          </a:p>
+          <a:p>
+            <a:pPr>
+              <a:buClr>
+                <a:srgbClr val="C05656"/>
+              </a:buClr>
+            </a:pPr>
+            <a:endParaRPr lang="ru-RU" dirty="0"/>
+          </a:p>
+        </p:txBody>
+      </p:sp>
+      <p:pic>
+        <p:nvPicPr>
+          <p:cNvPr id="20" name="Picture 15">
+            <a:extLst>
+              <a:ext uri="{FF2B5EF4-FFF2-40B4-BE49-F238E27FC236}">
+                <a16:creationId xmlns:a16="http://schemas.microsoft.com/office/drawing/2014/main" id="{7AEE9CAC-347C-43C2-AE87-6BC5566E6068}"/>
+              </a:ext>
+              <a:ext uri="{C183D7F6-B498-43B3-948B-1728B52AA6E4}">
+                <adec:decorative xmlns:adec="http://schemas.microsoft.com/office/drawing/2017/decorative" val="1"/>
+              </a:ext>
+            </a:extLst>
+          </p:cNvPr>
+          <p:cNvPicPr>
+            <a:picLocks noGrp="1" noRot="1" noChangeAspect="1" noMove="1" noResize="1" noEditPoints="1" noAdjustHandles="1" noChangeArrowheads="1" noChangeShapeType="1" noCrop="1"/>
+          </p:cNvPicPr>
+          <p:nvPr>
+            <p:extLst>
+              <p:ext uri="{386F3935-93C4-4BCD-93E2-E3B085C9AB24}">
+                <p16:designElem xmlns:p16="http://schemas.microsoft.com/office/powerpoint/2015/main" val="1"/>
+              </p:ext>
+            </p:extLst>
+          </p:nvPr>
+        </p:nvPicPr>
+        <p:blipFill rotWithShape="1">
+          <a:blip r:embed="rId3">
+            <a:extLst>
+              <a:ext uri="{28A0092B-C50C-407E-A947-70E740481C1C}">
+                <a14:useLocalDpi xmlns:a14="http://schemas.microsoft.com/office/drawing/2010/main" val="0"/>
+              </a:ext>
+            </a:extLst>
+          </a:blip>
+          <a:srcRect t="964" r="2807" b="1446"/>
+          <a:stretch/>
+        </p:blipFill>
+        <p:spPr>
+          <a:xfrm>
+            <a:off x="7232905" y="1"/>
+            <a:ext cx="4959095" cy="6858000"/>
+          </a:xfrm>
+          <a:prstGeom prst="rect">
+            <a:avLst/>
+          </a:prstGeom>
+        </p:spPr>
+      </p:pic>
+      <p:pic>
+        <p:nvPicPr>
+          <p:cNvPr id="11" name="Рисунок 10" descr="Изображение выглядит как текст, График, линия, снимок экрана">
+            <a:extLst>
+              <a:ext uri="{FF2B5EF4-FFF2-40B4-BE49-F238E27FC236}">
+                <a16:creationId xmlns:a16="http://schemas.microsoft.com/office/drawing/2014/main" id="{6BF0CC1F-5950-BD33-E5B3-BAE6EDFDF1CB}"/>
+              </a:ext>
+            </a:extLst>
+          </p:cNvPr>
+          <p:cNvPicPr>
+            <a:picLocks noChangeAspect="1"/>
+          </p:cNvPicPr>
+          <p:nvPr/>
+        </p:nvPicPr>
+        <p:blipFill>
+          <a:blip r:embed="rId4">
+            <a:extLst>
+              <a:ext uri="{28A0092B-C50C-407E-A947-70E740481C1C}">
+                <a14:useLocalDpi xmlns:a14="http://schemas.microsoft.com/office/drawing/2010/main" val="0"/>
+              </a:ext>
+            </a:extLst>
+          </a:blip>
+          <a:stretch>
+            <a:fillRect/>
+          </a:stretch>
+        </p:blipFill>
+        <p:spPr>
+          <a:xfrm>
+            <a:off x="7552945" y="1118892"/>
+            <a:ext cx="3995592" cy="4152518"/>
+          </a:xfrm>
+          <a:prstGeom prst="rect">
+            <a:avLst/>
+          </a:prstGeom>
+        </p:spPr>
+      </p:pic>
+    </p:spTree>
+    <p:extLst>
+      <p:ext uri="{BB962C8B-B14F-4D97-AF65-F5344CB8AC3E}">
+        <p14:creationId xmlns:p14="http://schemas.microsoft.com/office/powerpoint/2010/main" val="713036870"/>
       </p:ext>
     </p:extLst>
   </p:cSld>
@@ -6274,6 +8673,372 @@
     <p:extLst>
       <p:ext uri="{BB962C8B-B14F-4D97-AF65-F5344CB8AC3E}">
         <p14:creationId xmlns:p14="http://schemas.microsoft.com/office/powerpoint/2010/main" val="1716844059"/>
+      </p:ext>
+    </p:extLst>
+  </p:cSld>
+  <p:clrMapOvr>
+    <a:masterClrMapping/>
+  </p:clrMapOvr>
+</p:sld>
+</file>
+
+<file path=ppt/slides/slide20.xml><?xml version="1.0" encoding="utf-8"?>
+<p:sld xmlns:a="http://schemas.openxmlformats.org/drawingml/2006/main" xmlns:r="http://schemas.openxmlformats.org/officeDocument/2006/relationships" xmlns:p="http://schemas.openxmlformats.org/presentationml/2006/main">
+  <p:cSld>
+    <p:spTree>
+      <p:nvGrpSpPr>
+        <p:cNvPr id="1" name=""/>
+        <p:cNvGrpSpPr/>
+        <p:nvPr/>
+      </p:nvGrpSpPr>
+      <p:grpSpPr>
+        <a:xfrm>
+          <a:off x="0" y="0"/>
+          <a:ext cx="0" cy="0"/>
+          <a:chOff x="0" y="0"/>
+          <a:chExt cx="0" cy="0"/>
+        </a:xfrm>
+      </p:grpSpPr>
+      <p:sp>
+        <p:nvSpPr>
+          <p:cNvPr id="2" name="Заголовок 1">
+            <a:extLst>
+              <a:ext uri="{FF2B5EF4-FFF2-40B4-BE49-F238E27FC236}">
+                <a16:creationId xmlns:a16="http://schemas.microsoft.com/office/drawing/2014/main" id="{28C3C237-4FCC-3B42-0C28-424C9E8E4CC1}"/>
+              </a:ext>
+            </a:extLst>
+          </p:cNvPr>
+          <p:cNvSpPr>
+            <a:spLocks noGrp="1"/>
+          </p:cNvSpPr>
+          <p:nvPr>
+            <p:ph type="title"/>
+          </p:nvPr>
+        </p:nvSpPr>
+        <p:spPr/>
+        <p:txBody>
+          <a:bodyPr/>
+          <a:lstStyle/>
+          <a:p>
+            <a:r>
+              <a:rPr lang="ru-RU" dirty="0"/>
+              <a:t>Организационные</a:t>
+            </a:r>
+          </a:p>
+        </p:txBody>
+      </p:sp>
+      <p:sp>
+        <p:nvSpPr>
+          <p:cNvPr id="3" name="Объект 2">
+            <a:extLst>
+              <a:ext uri="{FF2B5EF4-FFF2-40B4-BE49-F238E27FC236}">
+                <a16:creationId xmlns:a16="http://schemas.microsoft.com/office/drawing/2014/main" id="{53BB8081-3FAC-5313-DD52-315159F3DC7F}"/>
+              </a:ext>
+            </a:extLst>
+          </p:cNvPr>
+          <p:cNvSpPr>
+            <a:spLocks noGrp="1"/>
+          </p:cNvSpPr>
+          <p:nvPr>
+            <p:ph idx="1"/>
+          </p:nvPr>
+        </p:nvSpPr>
+        <p:spPr/>
+        <p:txBody>
+          <a:bodyPr>
+            <a:normAutofit/>
+          </a:bodyPr>
+          <a:lstStyle/>
+          <a:p>
+            <a:r>
+              <a:rPr lang="ru-RU" dirty="0"/>
+              <a:t>контроль химической обстановки в повседневных условиях;</a:t>
+            </a:r>
+          </a:p>
+          <a:p>
+            <a:r>
+              <a:rPr lang="ru-RU" dirty="0"/>
+              <a:t>организация системы оповещения работников и населения в случае аварии и периодическая ее проверка;</a:t>
+            </a:r>
+          </a:p>
+          <a:p>
+            <a:r>
+              <a:rPr lang="ru-RU" dirty="0"/>
+              <a:t>обеспечение работников СИЗ и в первую очередь наибольшей работающей смены, содержание их в постоянной готовности;</a:t>
+            </a:r>
+          </a:p>
+          <a:p>
+            <a:r>
+              <a:rPr lang="ru-RU" dirty="0"/>
+              <a:t>заблаговременное прогнозирование зон возможного загрязнения АХОВ по реальным метеоданным (направление и скорость ветра в приземном слое атмосферы измеряется не менее 2-х раз в сутки).</a:t>
+            </a:r>
+          </a:p>
+          <a:p>
+            <a:r>
+              <a:rPr lang="ru-RU" dirty="0"/>
+              <a:t>организация укрытия в защитных сооружениях, имеющихся на предприятии или эвакуации рабочих, служащих и населения при необходимости.</a:t>
+            </a:r>
+          </a:p>
+        </p:txBody>
+      </p:sp>
+    </p:spTree>
+    <p:extLst>
+      <p:ext uri="{BB962C8B-B14F-4D97-AF65-F5344CB8AC3E}">
+        <p14:creationId xmlns:p14="http://schemas.microsoft.com/office/powerpoint/2010/main" val="1338890346"/>
+      </p:ext>
+    </p:extLst>
+  </p:cSld>
+  <p:clrMapOvr>
+    <a:masterClrMapping/>
+  </p:clrMapOvr>
+</p:sld>
+</file>
+
+<file path=ppt/slides/slide21.xml><?xml version="1.0" encoding="utf-8"?>
+<p:sld xmlns:a="http://schemas.openxmlformats.org/drawingml/2006/main" xmlns:r="http://schemas.openxmlformats.org/officeDocument/2006/relationships" xmlns:p="http://schemas.openxmlformats.org/presentationml/2006/main">
+  <p:cSld>
+    <p:spTree>
+      <p:nvGrpSpPr>
+        <p:cNvPr id="1" name=""/>
+        <p:cNvGrpSpPr/>
+        <p:nvPr/>
+      </p:nvGrpSpPr>
+      <p:grpSpPr>
+        <a:xfrm>
+          <a:off x="0" y="0"/>
+          <a:ext cx="0" cy="0"/>
+          <a:chOff x="0" y="0"/>
+          <a:chExt cx="0" cy="0"/>
+        </a:xfrm>
+      </p:grpSpPr>
+      <p:sp>
+        <p:nvSpPr>
+          <p:cNvPr id="2" name="Заголовок 1">
+            <a:extLst>
+              <a:ext uri="{FF2B5EF4-FFF2-40B4-BE49-F238E27FC236}">
+                <a16:creationId xmlns:a16="http://schemas.microsoft.com/office/drawing/2014/main" id="{94F75C1F-7423-200A-B1B1-5C738D28E2BF}"/>
+              </a:ext>
+            </a:extLst>
+          </p:cNvPr>
+          <p:cNvSpPr>
+            <a:spLocks noGrp="1"/>
+          </p:cNvSpPr>
+          <p:nvPr>
+            <p:ph type="title"/>
+          </p:nvPr>
+        </p:nvSpPr>
+        <p:spPr/>
+        <p:txBody>
+          <a:bodyPr/>
+          <a:lstStyle/>
+          <a:p>
+            <a:r>
+              <a:rPr lang="ru-RU" dirty="0"/>
+              <a:t>Инженерно-технические</a:t>
+            </a:r>
+          </a:p>
+        </p:txBody>
+      </p:sp>
+      <p:sp>
+        <p:nvSpPr>
+          <p:cNvPr id="3" name="Объект 2">
+            <a:extLst>
+              <a:ext uri="{FF2B5EF4-FFF2-40B4-BE49-F238E27FC236}">
+                <a16:creationId xmlns:a16="http://schemas.microsoft.com/office/drawing/2014/main" id="{D2A365A3-9BF6-F8EA-2500-8EEB61667C5E}"/>
+              </a:ext>
+            </a:extLst>
+          </p:cNvPr>
+          <p:cNvSpPr>
+            <a:spLocks noGrp="1"/>
+          </p:cNvSpPr>
+          <p:nvPr>
+            <p:ph idx="1"/>
+          </p:nvPr>
+        </p:nvSpPr>
+        <p:spPr/>
+        <p:txBody>
+          <a:bodyPr>
+            <a:normAutofit fontScale="85000" lnSpcReduction="10000"/>
+          </a:bodyPr>
+          <a:lstStyle/>
+          <a:p>
+            <a:r>
+              <a:rPr lang="ru-RU" dirty="0"/>
+              <a:t>содержание в исправном состоянии оборудования, КИП, средств автоматизации, трубопроводов, складов АХОВ, аварийной сигнализации;</a:t>
+            </a:r>
+          </a:p>
+          <a:p>
+            <a:r>
+              <a:rPr lang="ru-RU" dirty="0"/>
+              <a:t>своевременное выполнение графика планово-предупредительного ремонта химического оборудования и транспортных средств на ХОО;</a:t>
+            </a:r>
+          </a:p>
+          <a:p>
+            <a:r>
+              <a:rPr lang="ru-RU" dirty="0"/>
+              <a:t>содержание в рабочем состоянии технических средств обнаружения АХОВ;</a:t>
+            </a:r>
+          </a:p>
+          <a:p>
+            <a:r>
+              <a:rPr lang="ru-RU" dirty="0"/>
+              <a:t>рассредоточение запасов АХОВ, строительство для них заглубленных хранилищ, размещение под хранилищем АХОВ аварийных резервуаров ловушек, направленных стоков;</a:t>
+            </a:r>
+          </a:p>
+          <a:p>
+            <a:r>
+              <a:rPr lang="ru-RU" dirty="0"/>
+              <a:t>рекогносцировка и оборудование рубежей постановки отсечных водных завес на наиболее вероятных направлениях распространения АХОВ в зависимости от розы ветров;</a:t>
+            </a:r>
+          </a:p>
+          <a:p>
+            <a:r>
+              <a:rPr lang="ru-RU" dirty="0"/>
+              <a:t>поддержание в постоянной готовности газоспасательной службы формирований, предназначенных для ликвидации последствий химического загрязнения;</a:t>
+            </a:r>
+          </a:p>
+          <a:p>
+            <a:r>
+              <a:rPr lang="ru-RU" dirty="0"/>
+              <a:t>соблюдение на объекте установленных правил техники безопасности.</a:t>
+            </a:r>
+          </a:p>
+        </p:txBody>
+      </p:sp>
+    </p:spTree>
+    <p:extLst>
+      <p:ext uri="{BB962C8B-B14F-4D97-AF65-F5344CB8AC3E}">
+        <p14:creationId xmlns:p14="http://schemas.microsoft.com/office/powerpoint/2010/main" val="571093548"/>
+      </p:ext>
+    </p:extLst>
+  </p:cSld>
+  <p:clrMapOvr>
+    <a:masterClrMapping/>
+  </p:clrMapOvr>
+</p:sld>
+</file>
+
+<file path=ppt/slides/slide22.xml><?xml version="1.0" encoding="utf-8"?>
+<p:sld xmlns:a="http://schemas.openxmlformats.org/drawingml/2006/main" xmlns:r="http://schemas.openxmlformats.org/officeDocument/2006/relationships" xmlns:p="http://schemas.openxmlformats.org/presentationml/2006/main">
+  <p:cSld>
+    <p:spTree>
+      <p:nvGrpSpPr>
+        <p:cNvPr id="1" name=""/>
+        <p:cNvGrpSpPr/>
+        <p:nvPr/>
+      </p:nvGrpSpPr>
+      <p:grpSpPr>
+        <a:xfrm>
+          <a:off x="0" y="0"/>
+          <a:ext cx="0" cy="0"/>
+          <a:chOff x="0" y="0"/>
+          <a:chExt cx="0" cy="0"/>
+        </a:xfrm>
+      </p:grpSpPr>
+      <p:sp>
+        <p:nvSpPr>
+          <p:cNvPr id="2" name="Заголовок 1">
+            <a:extLst>
+              <a:ext uri="{FF2B5EF4-FFF2-40B4-BE49-F238E27FC236}">
+                <a16:creationId xmlns:a16="http://schemas.microsoft.com/office/drawing/2014/main" id="{FBA46298-1F83-C42F-7E35-D0A26B4D6A58}"/>
+              </a:ext>
+            </a:extLst>
+          </p:cNvPr>
+          <p:cNvSpPr>
+            <a:spLocks noGrp="1"/>
+          </p:cNvSpPr>
+          <p:nvPr>
+            <p:ph type="title"/>
+          </p:nvPr>
+        </p:nvSpPr>
+        <p:spPr/>
+        <p:txBody>
+          <a:bodyPr/>
+          <a:lstStyle/>
+          <a:p>
+            <a:r>
+              <a:rPr lang="ru-RU" dirty="0"/>
+              <a:t>Ответные</a:t>
+            </a:r>
+          </a:p>
+        </p:txBody>
+      </p:sp>
+      <p:sp>
+        <p:nvSpPr>
+          <p:cNvPr id="3" name="Объект 2">
+            <a:extLst>
+              <a:ext uri="{FF2B5EF4-FFF2-40B4-BE49-F238E27FC236}">
+                <a16:creationId xmlns:a16="http://schemas.microsoft.com/office/drawing/2014/main" id="{C092C358-28D3-62FC-244A-E9C42290D413}"/>
+              </a:ext>
+            </a:extLst>
+          </p:cNvPr>
+          <p:cNvSpPr>
+            <a:spLocks noGrp="1"/>
+          </p:cNvSpPr>
+          <p:nvPr>
+            <p:ph idx="1"/>
+          </p:nvPr>
+        </p:nvSpPr>
+        <p:spPr/>
+        <p:txBody>
+          <a:bodyPr>
+            <a:normAutofit fontScale="92500" lnSpcReduction="10000"/>
+          </a:bodyPr>
+          <a:lstStyle/>
+          <a:p>
+            <a:r>
+              <a:rPr lang="ru-RU" dirty="0"/>
+              <a:t>оповещается должностные лица, работники и население о возникновении аварии;</a:t>
+            </a:r>
+          </a:p>
+          <a:p>
+            <a:r>
+              <a:rPr lang="ru-RU" dirty="0"/>
+              <a:t>проводится оценка химической обстановки;</a:t>
+            </a:r>
+          </a:p>
+          <a:p>
+            <a:r>
+              <a:rPr lang="ru-RU" dirty="0"/>
+              <a:t>организуется ведение химической разведки и обозначение границ очага химического загрязнения;</a:t>
+            </a:r>
+          </a:p>
+          <a:p>
+            <a:r>
+              <a:rPr lang="ru-RU" dirty="0"/>
+              <a:t>организуется охрана района аварии;</a:t>
+            </a:r>
+          </a:p>
+          <a:p>
+            <a:r>
+              <a:rPr lang="ru-RU" dirty="0"/>
+              <a:t>используются средства индивидуальной и коллективной защиты;</a:t>
+            </a:r>
+          </a:p>
+          <a:p>
+            <a:r>
+              <a:rPr lang="ru-RU" dirty="0"/>
+              <a:t>организуется поиск, вынос пораженных и оказание им первой медицинской помощи;</a:t>
+            </a:r>
+          </a:p>
+          <a:p>
+            <a:r>
+              <a:rPr lang="ru-RU" dirty="0"/>
+              <a:t>проводится эвакуация работников из очага химического загрязнения или угрожаемой зоны загрязнения;</a:t>
+            </a:r>
+          </a:p>
+          <a:p>
+            <a:r>
+              <a:rPr lang="ru-RU" dirty="0"/>
+              <a:t>выполняются неотложные аварийно-технические мероприятия по локализации и ликвидации очага химического загрязнения.</a:t>
+            </a:r>
+          </a:p>
+        </p:txBody>
+      </p:sp>
+    </p:spTree>
+    <p:extLst>
+      <p:ext uri="{BB962C8B-B14F-4D97-AF65-F5344CB8AC3E}">
+        <p14:creationId xmlns:p14="http://schemas.microsoft.com/office/powerpoint/2010/main" val="3817157772"/>
       </p:ext>
     </p:extLst>
   </p:cSld>
@@ -6748,8 +9513,8 @@
           </a:p>
         </p:txBody>
       </p:sp>
-      <mc:AlternateContent xmlns:mc="http://schemas.openxmlformats.org/markup-compatibility/2006">
-        <mc:Choice xmlns:a14="http://schemas.microsoft.com/office/drawing/2010/main" Requires="a14">
+      <mc:AlternateContent xmlns:mc="http://schemas.openxmlformats.org/markup-compatibility/2006" xmlns:a14="http://schemas.microsoft.com/office/drawing/2010/main">
+        <mc:Choice Requires="a14">
           <p:sp>
             <p:nvSpPr>
               <p:cNvPr id="3" name="Объект 2">
@@ -7181,7 +9946,7 @@
             </p:txBody>
           </p:sp>
         </mc:Choice>
-        <mc:Fallback>
+        <mc:Fallback xmlns="">
           <p:sp>
             <p:nvSpPr>
               <p:cNvPr id="3" name="Объект 2">

</xml_diff>

<commit_message>
BZD prak 3 added
</commit_message>
<xml_diff>
--- a/BZD/AXOB.pptx
+++ b/BZD/AXOB.pptx
@@ -453,7 +453,7 @@
           <a:p>
             <a:fld id="{AC99739C-7997-42FA-BC92-C798E3E5AD0D}" type="datetimeFigureOut">
               <a:rPr lang="ru-RU" smtClean="0"/>
-              <a:t>15.11.2024</a:t>
+              <a:t>19.11.2024</a:t>
             </a:fld>
             <a:endParaRPr lang="ru-RU"/>
           </a:p>
@@ -751,7 +751,7 @@
           <a:p>
             <a:fld id="{AC99739C-7997-42FA-BC92-C798E3E5AD0D}" type="datetimeFigureOut">
               <a:rPr lang="ru-RU" smtClean="0"/>
-              <a:t>15.11.2024</a:t>
+              <a:t>19.11.2024</a:t>
             </a:fld>
             <a:endParaRPr lang="ru-RU"/>
           </a:p>
@@ -943,7 +943,7 @@
           <a:p>
             <a:fld id="{AC99739C-7997-42FA-BC92-C798E3E5AD0D}" type="datetimeFigureOut">
               <a:rPr lang="ru-RU" smtClean="0"/>
-              <a:t>15.11.2024</a:t>
+              <a:t>19.11.2024</a:t>
             </a:fld>
             <a:endParaRPr lang="ru-RU"/>
           </a:p>
@@ -1204,7 +1204,7 @@
           <a:p>
             <a:fld id="{AC99739C-7997-42FA-BC92-C798E3E5AD0D}" type="datetimeFigureOut">
               <a:rPr lang="ru-RU" smtClean="0"/>
-              <a:t>15.11.2024</a:t>
+              <a:t>19.11.2024</a:t>
             </a:fld>
             <a:endParaRPr lang="ru-RU"/>
           </a:p>
@@ -1628,7 +1628,7 @@
           <a:p>
             <a:fld id="{AC99739C-7997-42FA-BC92-C798E3E5AD0D}" type="datetimeFigureOut">
               <a:rPr lang="ru-RU" smtClean="0"/>
-              <a:t>15.11.2024</a:t>
+              <a:t>19.11.2024</a:t>
             </a:fld>
             <a:endParaRPr lang="ru-RU"/>
           </a:p>
@@ -2165,7 +2165,7 @@
           <a:p>
             <a:fld id="{AC99739C-7997-42FA-BC92-C798E3E5AD0D}" type="datetimeFigureOut">
               <a:rPr lang="ru-RU" smtClean="0"/>
-              <a:t>15.11.2024</a:t>
+              <a:t>19.11.2024</a:t>
             </a:fld>
             <a:endParaRPr lang="ru-RU"/>
           </a:p>
@@ -3029,7 +3029,7 @@
           <a:p>
             <a:fld id="{AC99739C-7997-42FA-BC92-C798E3E5AD0D}" type="datetimeFigureOut">
               <a:rPr lang="ru-RU" smtClean="0"/>
-              <a:t>15.11.2024</a:t>
+              <a:t>19.11.2024</a:t>
             </a:fld>
             <a:endParaRPr lang="ru-RU"/>
           </a:p>
@@ -3199,7 +3199,7 @@
           <a:p>
             <a:fld id="{AC99739C-7997-42FA-BC92-C798E3E5AD0D}" type="datetimeFigureOut">
               <a:rPr lang="ru-RU" smtClean="0"/>
-              <a:t>15.11.2024</a:t>
+              <a:t>19.11.2024</a:t>
             </a:fld>
             <a:endParaRPr lang="ru-RU"/>
           </a:p>
@@ -3383,7 +3383,7 @@
           <a:p>
             <a:fld id="{AC99739C-7997-42FA-BC92-C798E3E5AD0D}" type="datetimeFigureOut">
               <a:rPr lang="ru-RU" smtClean="0"/>
-              <a:t>15.11.2024</a:t>
+              <a:t>19.11.2024</a:t>
             </a:fld>
             <a:endParaRPr lang="ru-RU"/>
           </a:p>
@@ -3553,7 +3553,7 @@
           <a:p>
             <a:fld id="{AC99739C-7997-42FA-BC92-C798E3E5AD0D}" type="datetimeFigureOut">
               <a:rPr lang="ru-RU" smtClean="0"/>
-              <a:t>15.11.2024</a:t>
+              <a:t>19.11.2024</a:t>
             </a:fld>
             <a:endParaRPr lang="ru-RU"/>
           </a:p>
@@ -3797,7 +3797,7 @@
           <a:p>
             <a:fld id="{AC99739C-7997-42FA-BC92-C798E3E5AD0D}" type="datetimeFigureOut">
               <a:rPr lang="ru-RU" smtClean="0"/>
-              <a:t>15.11.2024</a:t>
+              <a:t>19.11.2024</a:t>
             </a:fld>
             <a:endParaRPr lang="ru-RU"/>
           </a:p>
@@ -4033,7 +4033,7 @@
           <a:p>
             <a:fld id="{AC99739C-7997-42FA-BC92-C798E3E5AD0D}" type="datetimeFigureOut">
               <a:rPr lang="ru-RU" smtClean="0"/>
-              <a:t>15.11.2024</a:t>
+              <a:t>19.11.2024</a:t>
             </a:fld>
             <a:endParaRPr lang="ru-RU"/>
           </a:p>
@@ -4499,7 +4499,7 @@
           <a:p>
             <a:fld id="{AC99739C-7997-42FA-BC92-C798E3E5AD0D}" type="datetimeFigureOut">
               <a:rPr lang="ru-RU" smtClean="0"/>
-              <a:t>15.11.2024</a:t>
+              <a:t>19.11.2024</a:t>
             </a:fld>
             <a:endParaRPr lang="ru-RU"/>
           </a:p>
@@ -4617,7 +4617,7 @@
           <a:p>
             <a:fld id="{AC99739C-7997-42FA-BC92-C798E3E5AD0D}" type="datetimeFigureOut">
               <a:rPr lang="ru-RU" smtClean="0"/>
-              <a:t>15.11.2024</a:t>
+              <a:t>19.11.2024</a:t>
             </a:fld>
             <a:endParaRPr lang="ru-RU"/>
           </a:p>
@@ -4712,7 +4712,7 @@
           <a:p>
             <a:fld id="{AC99739C-7997-42FA-BC92-C798E3E5AD0D}" type="datetimeFigureOut">
               <a:rPr lang="ru-RU" smtClean="0"/>
-              <a:t>15.11.2024</a:t>
+              <a:t>19.11.2024</a:t>
             </a:fld>
             <a:endParaRPr lang="ru-RU"/>
           </a:p>
@@ -4967,7 +4967,7 @@
           <a:p>
             <a:fld id="{AC99739C-7997-42FA-BC92-C798E3E5AD0D}" type="datetimeFigureOut">
               <a:rPr lang="ru-RU" smtClean="0"/>
-              <a:t>15.11.2024</a:t>
+              <a:t>19.11.2024</a:t>
             </a:fld>
             <a:endParaRPr lang="ru-RU"/>
           </a:p>
@@ -5267,7 +5267,7 @@
           <a:p>
             <a:fld id="{AC99739C-7997-42FA-BC92-C798E3E5AD0D}" type="datetimeFigureOut">
               <a:rPr lang="ru-RU" smtClean="0"/>
-              <a:t>15.11.2024</a:t>
+              <a:t>19.11.2024</a:t>
             </a:fld>
             <a:endParaRPr lang="ru-RU"/>
           </a:p>
@@ -5501,7 +5501,7 @@
           <a:p>
             <a:fld id="{AC99739C-7997-42FA-BC92-C798E3E5AD0D}" type="datetimeFigureOut">
               <a:rPr lang="ru-RU" smtClean="0"/>
-              <a:t>15.11.2024</a:t>
+              <a:t>19.11.2024</a:t>
             </a:fld>
             <a:endParaRPr lang="ru-RU"/>
           </a:p>
@@ -6308,13 +6308,22 @@
               <a:t> </a:t>
             </a:r>
             <a:r>
-              <a:rPr lang="ru-RU" dirty="0">
-                <a:solidFill>
-                  <a:srgbClr val="FF0000"/>
-                </a:solidFill>
-              </a:rPr>
-              <a:t>вопрос эвакуации????</a:t>
-            </a:r>
+              <a:rPr lang="ru-RU" dirty="0"/>
+              <a:t>при благоприятных условиях (достаточного времени до подхода зараженного облака к предприятию) возможно эвакуация (выведение) людей за пределы зоны химического заражения на расстояние половины ширины т.е. на 2</a:t>
+            </a:r>
+            <a:r>
+              <a:rPr lang="en-US" dirty="0"/>
+              <a:t>50</a:t>
+            </a:r>
+            <a:r>
+              <a:rPr lang="ru-RU" dirty="0"/>
+              <a:t>м.</a:t>
+            </a:r>
+            <a:endParaRPr lang="ru-RU" dirty="0">
+              <a:solidFill>
+                <a:srgbClr val="FF0000"/>
+              </a:solidFill>
+            </a:endParaRPr>
           </a:p>
         </p:txBody>
       </p:sp>
@@ -6626,8 +6635,8 @@
           </a:prstGeom>
         </p:spPr>
       </p:pic>
-      <mc:AlternateContent xmlns:mc="http://schemas.openxmlformats.org/markup-compatibility/2006">
-        <mc:Choice xmlns:p14="http://schemas.microsoft.com/office/powerpoint/2010/main" Requires="p14">
+      <mc:AlternateContent xmlns:mc="http://schemas.openxmlformats.org/markup-compatibility/2006" xmlns:p14="http://schemas.microsoft.com/office/powerpoint/2010/main">
+        <mc:Choice Requires="p14">
           <p:contentPart p14:bwMode="auto" r:id="rId5">
             <p14:nvContentPartPr>
               <p14:cNvPr id="20" name="Рукописный ввод 19">
@@ -6646,7 +6655,7 @@
             </p14:xfrm>
           </p:contentPart>
         </mc:Choice>
-        <mc:Fallback>
+        <mc:Fallback xmlns="">
           <p:pic>
             <p:nvPicPr>
               <p:cNvPr id="20" name="Рукописный ввод 19">
@@ -6677,8 +6686,8 @@
           </p:pic>
         </mc:Fallback>
       </mc:AlternateContent>
-      <mc:AlternateContent xmlns:mc="http://schemas.openxmlformats.org/markup-compatibility/2006">
-        <mc:Choice xmlns:p14="http://schemas.microsoft.com/office/powerpoint/2010/main" Requires="p14">
+      <mc:AlternateContent xmlns:mc="http://schemas.openxmlformats.org/markup-compatibility/2006" xmlns:p14="http://schemas.microsoft.com/office/powerpoint/2010/main">
+        <mc:Choice Requires="p14">
           <p:contentPart p14:bwMode="auto" r:id="rId7">
             <p14:nvContentPartPr>
               <p14:cNvPr id="21" name="Рукописный ввод 20">
@@ -6697,7 +6706,7 @@
             </p14:xfrm>
           </p:contentPart>
         </mc:Choice>
-        <mc:Fallback>
+        <mc:Fallback xmlns="">
           <p:pic>
             <p:nvPicPr>
               <p:cNvPr id="21" name="Рукописный ввод 20">
@@ -6728,8 +6737,8 @@
           </p:pic>
         </mc:Fallback>
       </mc:AlternateContent>
-      <mc:AlternateContent xmlns:mc="http://schemas.openxmlformats.org/markup-compatibility/2006">
-        <mc:Choice xmlns:p14="http://schemas.microsoft.com/office/powerpoint/2010/main" Requires="p14">
+      <mc:AlternateContent xmlns:mc="http://schemas.openxmlformats.org/markup-compatibility/2006" xmlns:p14="http://schemas.microsoft.com/office/powerpoint/2010/main">
+        <mc:Choice Requires="p14">
           <p:contentPart p14:bwMode="auto" r:id="rId9">
             <p14:nvContentPartPr>
               <p14:cNvPr id="22" name="Рукописный ввод 21">
@@ -6748,7 +6757,7 @@
             </p14:xfrm>
           </p:contentPart>
         </mc:Choice>
-        <mc:Fallback>
+        <mc:Fallback xmlns="">
           <p:pic>
             <p:nvPicPr>
               <p:cNvPr id="22" name="Рукописный ввод 21">
@@ -6779,8 +6788,8 @@
           </p:pic>
         </mc:Fallback>
       </mc:AlternateContent>
-      <mc:AlternateContent xmlns:mc="http://schemas.openxmlformats.org/markup-compatibility/2006">
-        <mc:Choice xmlns:p14="http://schemas.microsoft.com/office/powerpoint/2010/main" Requires="p14">
+      <mc:AlternateContent xmlns:mc="http://schemas.openxmlformats.org/markup-compatibility/2006" xmlns:p14="http://schemas.microsoft.com/office/powerpoint/2010/main">
+        <mc:Choice Requires="p14">
           <p:contentPart p14:bwMode="auto" r:id="rId10">
             <p14:nvContentPartPr>
               <p14:cNvPr id="23" name="Рукописный ввод 22">
@@ -6799,7 +6808,7 @@
             </p14:xfrm>
           </p:contentPart>
         </mc:Choice>
-        <mc:Fallback>
+        <mc:Fallback xmlns="">
           <p:pic>
             <p:nvPicPr>
               <p:cNvPr id="23" name="Рукописный ввод 22">
@@ -6887,8 +6896,8 @@
           </a:p>
         </p:txBody>
       </p:sp>
-      <mc:AlternateContent xmlns:mc="http://schemas.openxmlformats.org/markup-compatibility/2006">
-        <mc:Choice xmlns:p14="http://schemas.microsoft.com/office/powerpoint/2010/main" Requires="p14">
+      <mc:AlternateContent xmlns:mc="http://schemas.openxmlformats.org/markup-compatibility/2006" xmlns:p14="http://schemas.microsoft.com/office/powerpoint/2010/main">
+        <mc:Choice Requires="p14">
           <p:contentPart p14:bwMode="auto" r:id="rId11">
             <p14:nvContentPartPr>
               <p14:cNvPr id="24" name="Рукописный ввод 23">
@@ -6907,7 +6916,7 @@
             </p14:xfrm>
           </p:contentPart>
         </mc:Choice>
-        <mc:Fallback>
+        <mc:Fallback xmlns="">
           <p:pic>
             <p:nvPicPr>
               <p:cNvPr id="24" name="Рукописный ввод 23">
@@ -6996,8 +7005,8 @@
           </a:p>
         </p:txBody>
       </p:sp>
-      <mc:AlternateContent xmlns:mc="http://schemas.openxmlformats.org/markup-compatibility/2006">
-        <mc:Choice xmlns:a14="http://schemas.microsoft.com/office/drawing/2010/main" Requires="a14">
+      <mc:AlternateContent xmlns:mc="http://schemas.openxmlformats.org/markup-compatibility/2006" xmlns:a14="http://schemas.microsoft.com/office/drawing/2010/main">
+        <mc:Choice Requires="a14">
           <p:sp>
             <p:nvSpPr>
               <p:cNvPr id="3" name="Объект 2">
@@ -7170,7 +7179,7 @@
             </p:txBody>
           </p:sp>
         </mc:Choice>
-        <mc:Fallback>
+        <mc:Fallback xmlns="">
           <p:sp>
             <p:nvSpPr>
               <p:cNvPr id="3" name="Объект 2">
@@ -7268,8 +7277,8 @@
           </a:p>
         </p:txBody>
       </p:sp>
-      <mc:AlternateContent xmlns:mc="http://schemas.openxmlformats.org/markup-compatibility/2006">
-        <mc:Choice xmlns:a14="http://schemas.microsoft.com/office/drawing/2010/main" Requires="a14">
+      <mc:AlternateContent xmlns:mc="http://schemas.openxmlformats.org/markup-compatibility/2006" xmlns:a14="http://schemas.microsoft.com/office/drawing/2010/main">
+        <mc:Choice Requires="a14">
           <p:sp>
             <p:nvSpPr>
               <p:cNvPr id="3" name="Объект 2">
@@ -7488,7 +7497,7 @@
             </p:txBody>
           </p:sp>
         </mc:Choice>
-        <mc:Fallback>
+        <mc:Fallback xmlns="">
           <p:sp>
             <p:nvSpPr>
               <p:cNvPr id="3" name="Объект 2">
@@ -7609,16 +7618,13 @@
           <a:p>
             <a:r>
               <a:rPr lang="ru-RU" dirty="0"/>
-              <a:t>За время подхода зараженного облака к предприятию, равное примерно 9 минутам при хорошо организованном оповещении о химической опасности можно подготовить работников к необходимости нахождения в химически опасной зоне, а также достаточно времени чтобы работников вывести за пределы опасной зоны (при скорости передвижения пешехода 5 км/ч возможно за 9 мин преодолеть расстояние почти в 750 м, что в </a:t>
-            </a:r>
-            <a:r>
-              <a:rPr lang="ru-RU" dirty="0">
-                <a:solidFill>
-                  <a:srgbClr val="FF0000"/>
-                </a:solidFill>
-              </a:rPr>
-              <a:t>ЧЕ???</a:t>
-            </a:r>
+              <a:t>За время подхода зараженного облака к предприятию, равное примерно 9 минутам при хорошо организованном оповещении о химической опасности можно подготовить работников к необходимости нахождения в химически опасной зоне, а также достаточно времени чтобы работников вывести за пределы опасной зоны (при скорости передвижения пешехода 5 км/ч возможно за 9 мин преодолеть расстояние почти в 750 м, что в что в 3 раза превышает половину ширины зоны химического загрязнения, т.е. на 500 м).</a:t>
+            </a:r>
+            <a:endParaRPr lang="ru-RU" dirty="0">
+              <a:solidFill>
+                <a:srgbClr val="FF0000"/>
+              </a:solidFill>
+            </a:endParaRPr>
           </a:p>
         </p:txBody>
       </p:sp>
@@ -7680,8 +7686,8 @@
           </a:p>
         </p:txBody>
       </p:sp>
-      <mc:AlternateContent xmlns:mc="http://schemas.openxmlformats.org/markup-compatibility/2006">
-        <mc:Choice xmlns:a14="http://schemas.microsoft.com/office/drawing/2010/main" Requires="a14">
+      <mc:AlternateContent xmlns:mc="http://schemas.openxmlformats.org/markup-compatibility/2006" xmlns:a14="http://schemas.microsoft.com/office/drawing/2010/main">
+        <mc:Choice Requires="a14">
           <p:sp>
             <p:nvSpPr>
               <p:cNvPr id="3" name="Объект 2">
@@ -7858,13 +7864,7 @@
                         <a:rPr lang="ru-RU" b="0" i="1" smtClean="0">
                           <a:latin typeface="Cambria Math" panose="02040503050406030204" pitchFamily="18" charset="0"/>
                         </a:rPr>
-                        <m:t>=1 ч</m:t>
-                      </m:r>
-                      <m:r>
-                        <a:rPr lang="ru-RU" b="0" i="1" smtClean="0">
-                          <a:latin typeface="Cambria Math" panose="02040503050406030204" pitchFamily="18" charset="0"/>
-                        </a:rPr>
-                        <m:t> ∗0,32=19,2 минуты</m:t>
+                        <m:t>=1 ч ∗0,32=19,2 минуты</m:t>
                       </m:r>
                     </m:oMath>
                   </m:oMathPara>
@@ -7874,7 +7874,7 @@
             </p:txBody>
           </p:sp>
         </mc:Choice>
-        <mc:Fallback>
+        <mc:Fallback xmlns="">
           <p:sp>
             <p:nvSpPr>
               <p:cNvPr id="3" name="Объект 2">
@@ -8066,8 +8066,8 @@
           </a:p>
         </p:txBody>
       </p:sp>
-      <mc:AlternateContent xmlns:mc="http://schemas.openxmlformats.org/markup-compatibility/2006">
-        <mc:Choice xmlns:a14="http://schemas.microsoft.com/office/drawing/2010/main" Requires="a14">
+      <mc:AlternateContent xmlns:mc="http://schemas.openxmlformats.org/markup-compatibility/2006" xmlns:a14="http://schemas.microsoft.com/office/drawing/2010/main">
+        <mc:Choice Requires="a14">
           <p:sp>
             <p:nvSpPr>
               <p:cNvPr id="3" name="Объект 2">
@@ -8210,7 +8210,7 @@
             </p:txBody>
           </p:sp>
         </mc:Choice>
-        <mc:Fallback>
+        <mc:Fallback xmlns="">
           <p:sp>
             <p:nvSpPr>
               <p:cNvPr id="3" name="Объект 2">

</xml_diff>